<commit_message>
dio mio como e posible ete sucesoooo
</commit_message>
<xml_diff>
--- a/Design/Capstone 2 Presentation.pptx
+++ b/Design/Capstone 2 Presentation.pptx
@@ -5,10 +5,10 @@
     <p:sldMasterId id="2147483688" r:id="rId1"/>
   </p:sldMasterIdLst>
   <p:notesMasterIdLst>
-    <p:notesMasterId r:id="rId16"/>
+    <p:notesMasterId r:id="rId19"/>
   </p:notesMasterIdLst>
   <p:handoutMasterIdLst>
-    <p:handoutMasterId r:id="rId17"/>
+    <p:handoutMasterId r:id="rId20"/>
   </p:handoutMasterIdLst>
   <p:sldIdLst>
     <p:sldId id="375" r:id="rId2"/>
@@ -17,14 +17,17 @@
     <p:sldId id="390" r:id="rId5"/>
     <p:sldId id="399" r:id="rId6"/>
     <p:sldId id="403" r:id="rId7"/>
-    <p:sldId id="404" r:id="rId8"/>
-    <p:sldId id="405" r:id="rId9"/>
-    <p:sldId id="406" r:id="rId10"/>
-    <p:sldId id="407" r:id="rId11"/>
-    <p:sldId id="408" r:id="rId12"/>
-    <p:sldId id="409" r:id="rId13"/>
-    <p:sldId id="402" r:id="rId14"/>
-    <p:sldId id="354" r:id="rId15"/>
+    <p:sldId id="414" r:id="rId8"/>
+    <p:sldId id="404" r:id="rId9"/>
+    <p:sldId id="405" r:id="rId10"/>
+    <p:sldId id="406" r:id="rId11"/>
+    <p:sldId id="410" r:id="rId12"/>
+    <p:sldId id="407" r:id="rId13"/>
+    <p:sldId id="408" r:id="rId14"/>
+    <p:sldId id="409" r:id="rId15"/>
+    <p:sldId id="411" r:id="rId16"/>
+    <p:sldId id="402" r:id="rId17"/>
+    <p:sldId id="354" r:id="rId18"/>
   </p:sldIdLst>
   <p:sldSz cx="12192000" cy="6858000"/>
   <p:notesSz cx="6858000" cy="9144000"/>
@@ -242,7 +245,7 @@
           <a:p>
             <a:fld id="{29AF74A3-A148-41CF-A2D5-46E8C0B6F9F1}" type="datetimeFigureOut">
               <a:rPr lang="en-US" smtClean="0"/>
-              <a:t>9/14/2023</a:t>
+              <a:t>9/18/2023</a:t>
             </a:fld>
             <a:endParaRPr lang="en-US"/>
           </a:p>
@@ -420,7 +423,7 @@
           <a:p>
             <a:fld id="{1C223EFC-526B-4EF2-8A0A-F01C60CA2A67}" type="datetimeFigureOut">
               <a:rPr lang="en-US" smtClean="0"/>
-              <a:t>9/14/2023</a:t>
+              <a:t>9/18/2023</a:t>
             </a:fld>
             <a:endParaRPr lang="en-US" dirty="0"/>
           </a:p>
@@ -4577,7 +4580,7 @@
                 <a:latin typeface="+mj-lt"/>
                 <a:cs typeface="Times New Roman" panose="02020603050405020304" pitchFamily="18" charset="0"/>
               </a:rPr>
-              <a:t>Date: February 28</a:t>
+              <a:t>Date: September 19</a:t>
             </a:r>
             <a:r>
               <a:rPr lang="en-US" sz="2000" b="1" baseline="30000" dirty="0">
@@ -4640,6 +4643,567 @@
           <a:chExt cx="0" cy="0"/>
         </a:xfrm>
       </p:grpSpPr>
+      <p:sp useBgFill="1">
+        <p:nvSpPr>
+          <p:cNvPr id="10" name="Slide Background">
+            <a:extLst>
+              <a:ext uri="{FF2B5EF4-FFF2-40B4-BE49-F238E27FC236}">
+                <a16:creationId xmlns:a16="http://schemas.microsoft.com/office/drawing/2014/main" id="{C0763A76-9F1C-4FC5-82B7-DD475DA461B2}"/>
+              </a:ext>
+              <a:ext uri="{C183D7F6-B498-43B3-948B-1728B52AA6E4}">
+                <adec:decorative xmlns:adec="http://schemas.microsoft.com/office/drawing/2017/decorative" val="1"/>
+              </a:ext>
+            </a:extLst>
+          </p:cNvPr>
+          <p:cNvSpPr>
+            <a:spLocks noGrp="1" noRot="1" noChangeAspect="1" noMove="1" noResize="1" noEditPoints="1" noAdjustHandles="1" noChangeArrowheads="1" noChangeShapeType="1" noTextEdit="1"/>
+          </p:cNvSpPr>
+          <p:nvPr>
+            <p:extLst>
+              <p:ext uri="{386F3935-93C4-4BCD-93E2-E3B085C9AB24}">
+                <p16:designElem xmlns:p16="http://schemas.microsoft.com/office/powerpoint/2015/main" val="1"/>
+              </p:ext>
+            </p:extLst>
+          </p:nvPr>
+        </p:nvSpPr>
+        <p:spPr bwMode="white">
+          <a:xfrm>
+            <a:off x="-1" y="0"/>
+            <a:ext cx="12191999" cy="6858000"/>
+          </a:xfrm>
+          <a:prstGeom prst="rect">
+            <a:avLst/>
+          </a:prstGeom>
+          <a:ln>
+            <a:noFill/>
+          </a:ln>
+        </p:spPr>
+        <p:style>
+          <a:lnRef idx="2">
+            <a:schemeClr val="accent1">
+              <a:shade val="50000"/>
+            </a:schemeClr>
+          </a:lnRef>
+          <a:fillRef idx="1">
+            <a:schemeClr val="accent1"/>
+          </a:fillRef>
+          <a:effectRef idx="0">
+            <a:schemeClr val="accent1"/>
+          </a:effectRef>
+          <a:fontRef idx="minor">
+            <a:schemeClr val="lt1"/>
+          </a:fontRef>
+        </p:style>
+        <p:txBody>
+          <a:bodyPr rtlCol="0" anchor="ctr"/>
+          <a:lstStyle>
+            <a:defPPr>
+              <a:defRPr lang="en-US"/>
+            </a:defPPr>
+            <a:lvl1pPr marL="0" algn="l" defTabSz="914400" rtl="0" eaLnBrk="1" latinLnBrk="0" hangingPunct="1">
+              <a:defRPr sz="1800" kern="1200">
+                <a:solidFill>
+                  <a:schemeClr val="lt1"/>
+                </a:solidFill>
+                <a:latin typeface="+mn-lt"/>
+                <a:ea typeface="+mn-ea"/>
+                <a:cs typeface="+mn-cs"/>
+              </a:defRPr>
+            </a:lvl1pPr>
+            <a:lvl2pPr marL="457200" algn="l" defTabSz="914400" rtl="0" eaLnBrk="1" latinLnBrk="0" hangingPunct="1">
+              <a:defRPr sz="1800" kern="1200">
+                <a:solidFill>
+                  <a:schemeClr val="lt1"/>
+                </a:solidFill>
+                <a:latin typeface="+mn-lt"/>
+                <a:ea typeface="+mn-ea"/>
+                <a:cs typeface="+mn-cs"/>
+              </a:defRPr>
+            </a:lvl2pPr>
+            <a:lvl3pPr marL="914400" algn="l" defTabSz="914400" rtl="0" eaLnBrk="1" latinLnBrk="0" hangingPunct="1">
+              <a:defRPr sz="1800" kern="1200">
+                <a:solidFill>
+                  <a:schemeClr val="lt1"/>
+                </a:solidFill>
+                <a:latin typeface="+mn-lt"/>
+                <a:ea typeface="+mn-ea"/>
+                <a:cs typeface="+mn-cs"/>
+              </a:defRPr>
+            </a:lvl3pPr>
+            <a:lvl4pPr marL="1371600" algn="l" defTabSz="914400" rtl="0" eaLnBrk="1" latinLnBrk="0" hangingPunct="1">
+              <a:defRPr sz="1800" kern="1200">
+                <a:solidFill>
+                  <a:schemeClr val="lt1"/>
+                </a:solidFill>
+                <a:latin typeface="+mn-lt"/>
+                <a:ea typeface="+mn-ea"/>
+                <a:cs typeface="+mn-cs"/>
+              </a:defRPr>
+            </a:lvl4pPr>
+            <a:lvl5pPr marL="1828800" algn="l" defTabSz="914400" rtl="0" eaLnBrk="1" latinLnBrk="0" hangingPunct="1">
+              <a:defRPr sz="1800" kern="1200">
+                <a:solidFill>
+                  <a:schemeClr val="lt1"/>
+                </a:solidFill>
+                <a:latin typeface="+mn-lt"/>
+                <a:ea typeface="+mn-ea"/>
+                <a:cs typeface="+mn-cs"/>
+              </a:defRPr>
+            </a:lvl5pPr>
+            <a:lvl6pPr marL="2286000" algn="l" defTabSz="914400" rtl="0" eaLnBrk="1" latinLnBrk="0" hangingPunct="1">
+              <a:defRPr sz="1800" kern="1200">
+                <a:solidFill>
+                  <a:schemeClr val="lt1"/>
+                </a:solidFill>
+                <a:latin typeface="+mn-lt"/>
+                <a:ea typeface="+mn-ea"/>
+                <a:cs typeface="+mn-cs"/>
+              </a:defRPr>
+            </a:lvl6pPr>
+            <a:lvl7pPr marL="2743200" algn="l" defTabSz="914400" rtl="0" eaLnBrk="1" latinLnBrk="0" hangingPunct="1">
+              <a:defRPr sz="1800" kern="1200">
+                <a:solidFill>
+                  <a:schemeClr val="lt1"/>
+                </a:solidFill>
+                <a:latin typeface="+mn-lt"/>
+                <a:ea typeface="+mn-ea"/>
+                <a:cs typeface="+mn-cs"/>
+              </a:defRPr>
+            </a:lvl7pPr>
+            <a:lvl8pPr marL="3200400" algn="l" defTabSz="914400" rtl="0" eaLnBrk="1" latinLnBrk="0" hangingPunct="1">
+              <a:defRPr sz="1800" kern="1200">
+                <a:solidFill>
+                  <a:schemeClr val="lt1"/>
+                </a:solidFill>
+                <a:latin typeface="+mn-lt"/>
+                <a:ea typeface="+mn-ea"/>
+                <a:cs typeface="+mn-cs"/>
+              </a:defRPr>
+            </a:lvl8pPr>
+            <a:lvl9pPr marL="3657600" algn="l" defTabSz="914400" rtl="0" eaLnBrk="1" latinLnBrk="0" hangingPunct="1">
+              <a:defRPr sz="1800" kern="1200">
+                <a:solidFill>
+                  <a:schemeClr val="lt1"/>
+                </a:solidFill>
+                <a:latin typeface="+mn-lt"/>
+                <a:ea typeface="+mn-ea"/>
+                <a:cs typeface="+mn-cs"/>
+              </a:defRPr>
+            </a:lvl9pPr>
+          </a:lstStyle>
+          <a:p>
+            <a:pPr algn="ctr"/>
+            <a:endParaRPr lang="en-US"/>
+          </a:p>
+        </p:txBody>
+      </p:sp>
+      <p:sp useBgFill="1">
+        <p:nvSpPr>
+          <p:cNvPr id="12" name="Rectangle 11">
+            <a:extLst>
+              <a:ext uri="{FF2B5EF4-FFF2-40B4-BE49-F238E27FC236}">
+                <a16:creationId xmlns:a16="http://schemas.microsoft.com/office/drawing/2014/main" id="{E81BF4F6-F2CF-4984-9D14-D6966D92F99F}"/>
+              </a:ext>
+              <a:ext uri="{C183D7F6-B498-43B3-948B-1728B52AA6E4}">
+                <adec:decorative xmlns:adec="http://schemas.microsoft.com/office/drawing/2017/decorative" val="1"/>
+              </a:ext>
+            </a:extLst>
+          </p:cNvPr>
+          <p:cNvSpPr>
+            <a:spLocks noGrp="1" noRot="1" noChangeAspect="1" noMove="1" noResize="1" noEditPoints="1" noAdjustHandles="1" noChangeArrowheads="1" noChangeShapeType="1" noTextEdit="1"/>
+          </p:cNvSpPr>
+          <p:nvPr>
+            <p:extLst>
+              <p:ext uri="{386F3935-93C4-4BCD-93E2-E3B085C9AB24}">
+                <p16:designElem xmlns:p16="http://schemas.microsoft.com/office/powerpoint/2015/main" val="1"/>
+              </p:ext>
+            </p:extLst>
+          </p:nvPr>
+        </p:nvSpPr>
+        <p:spPr>
+          <a:xfrm>
+            <a:off x="1" y="0"/>
+            <a:ext cx="8522446" cy="2285999"/>
+          </a:xfrm>
+          <a:prstGeom prst="rect">
+            <a:avLst/>
+          </a:prstGeom>
+          <a:ln>
+            <a:noFill/>
+          </a:ln>
+          <a:effectLst>
+            <a:outerShdw blurRad="596900" dist="304800" dir="7140000" sx="90000" sy="90000" algn="t" rotWithShape="0">
+              <a:srgbClr val="000000">
+                <a:alpha val="15000"/>
+              </a:srgbClr>
+            </a:outerShdw>
+          </a:effectLst>
+        </p:spPr>
+        <p:style>
+          <a:lnRef idx="2">
+            <a:schemeClr val="accent1">
+              <a:shade val="50000"/>
+            </a:schemeClr>
+          </a:lnRef>
+          <a:fillRef idx="1">
+            <a:schemeClr val="accent1"/>
+          </a:fillRef>
+          <a:effectRef idx="0">
+            <a:schemeClr val="accent1"/>
+          </a:effectRef>
+          <a:fontRef idx="minor">
+            <a:schemeClr val="lt1"/>
+          </a:fontRef>
+        </p:style>
+        <p:txBody>
+          <a:bodyPr rtlCol="0" anchor="ctr"/>
+          <a:lstStyle/>
+          <a:p>
+            <a:pPr algn="ctr"/>
+            <a:endParaRPr lang="en-US"/>
+          </a:p>
+        </p:txBody>
+      </p:sp>
+      <p:sp>
+        <p:nvSpPr>
+          <p:cNvPr id="2" name="Title 1">
+            <a:extLst>
+              <a:ext uri="{FF2B5EF4-FFF2-40B4-BE49-F238E27FC236}">
+                <a16:creationId xmlns:a16="http://schemas.microsoft.com/office/drawing/2014/main" id="{829E97F6-7A08-129C-E46E-996FD245C5DE}"/>
+              </a:ext>
+            </a:extLst>
+          </p:cNvPr>
+          <p:cNvSpPr>
+            <a:spLocks noGrp="1"/>
+          </p:cNvSpPr>
+          <p:nvPr>
+            <p:ph type="title"/>
+          </p:nvPr>
+        </p:nvSpPr>
+        <p:spPr>
+          <a:xfrm>
+            <a:off x="761803" y="350196"/>
+            <a:ext cx="4646904" cy="1624520"/>
+          </a:xfrm>
+        </p:spPr>
+        <p:txBody>
+          <a:bodyPr anchor="ctr">
+            <a:normAutofit/>
+          </a:bodyPr>
+          <a:lstStyle/>
+          <a:p>
+            <a:r>
+              <a:rPr lang="en-US" sz="4000"/>
+              <a:t>Interface</a:t>
+            </a:r>
+          </a:p>
+        </p:txBody>
+      </p:sp>
+      <p:sp>
+        <p:nvSpPr>
+          <p:cNvPr id="3" name="Content Placeholder 2">
+            <a:extLst>
+              <a:ext uri="{FF2B5EF4-FFF2-40B4-BE49-F238E27FC236}">
+                <a16:creationId xmlns:a16="http://schemas.microsoft.com/office/drawing/2014/main" id="{6B4A1A3B-D801-C4FB-19BF-01040CA15176}"/>
+              </a:ext>
+            </a:extLst>
+          </p:cNvPr>
+          <p:cNvSpPr>
+            <a:spLocks noGrp="1"/>
+          </p:cNvSpPr>
+          <p:nvPr>
+            <p:ph idx="1"/>
+          </p:nvPr>
+        </p:nvSpPr>
+        <p:spPr>
+          <a:xfrm>
+            <a:off x="724547" y="2536826"/>
+            <a:ext cx="4646905" cy="1784347"/>
+          </a:xfrm>
+        </p:spPr>
+        <p:txBody>
+          <a:bodyPr anchor="ctr">
+            <a:normAutofit/>
+          </a:bodyPr>
+          <a:lstStyle/>
+          <a:p>
+            <a:r>
+              <a:rPr lang="en-US" sz="2000" dirty="0"/>
+              <a:t>Real-time Monitoring for Implant</a:t>
+            </a:r>
+          </a:p>
+          <a:p>
+            <a:r>
+              <a:rPr lang="en-US" sz="2000" dirty="0"/>
+              <a:t>New tabs:</a:t>
+            </a:r>
+          </a:p>
+          <a:p>
+            <a:pPr lvl="1"/>
+            <a:r>
+              <a:rPr lang="en-US" sz="2000" dirty="0"/>
+              <a:t>Listener Creation</a:t>
+            </a:r>
+          </a:p>
+        </p:txBody>
+      </p:sp>
+      <p:sp>
+        <p:nvSpPr>
+          <p:cNvPr id="4" name="Slide Number Placeholder 3">
+            <a:extLst>
+              <a:ext uri="{FF2B5EF4-FFF2-40B4-BE49-F238E27FC236}">
+                <a16:creationId xmlns:a16="http://schemas.microsoft.com/office/drawing/2014/main" id="{D0A5D4C0-13FF-B554-F6F0-CD717181E5F2}"/>
+              </a:ext>
+            </a:extLst>
+          </p:cNvPr>
+          <p:cNvSpPr>
+            <a:spLocks noGrp="1"/>
+          </p:cNvSpPr>
+          <p:nvPr>
+            <p:ph type="sldNum" sz="quarter" idx="12"/>
+          </p:nvPr>
+        </p:nvSpPr>
+        <p:spPr>
+          <a:xfrm>
+            <a:off x="8732520" y="6356350"/>
+            <a:ext cx="3200400" cy="365125"/>
+          </a:xfrm>
+        </p:spPr>
+        <p:txBody>
+          <a:bodyPr>
+            <a:normAutofit/>
+          </a:bodyPr>
+          <a:lstStyle/>
+          <a:p>
+            <a:pPr>
+              <a:spcAft>
+                <a:spcPts val="600"/>
+              </a:spcAft>
+            </a:pPr>
+            <a:fld id="{A52BEA90-E6BE-45F4-8D5D-C2E01FE3DBCB}" type="slidenum">
+              <a:rPr lang="en-US">
+                <a:solidFill>
+                  <a:srgbClr val="FFFFFF"/>
+                </a:solidFill>
+              </a:rPr>
+              <a:pPr>
+                <a:spcAft>
+                  <a:spcPts val="600"/>
+                </a:spcAft>
+              </a:pPr>
+              <a:t>10</a:t>
+            </a:fld>
+            <a:endParaRPr lang="en-US">
+              <a:solidFill>
+                <a:srgbClr val="FFFFFF"/>
+              </a:solidFill>
+            </a:endParaRPr>
+          </a:p>
+        </p:txBody>
+      </p:sp>
+      <p:sp>
+        <p:nvSpPr>
+          <p:cNvPr id="5" name="TextBox 4">
+            <a:extLst>
+              <a:ext uri="{FF2B5EF4-FFF2-40B4-BE49-F238E27FC236}">
+                <a16:creationId xmlns:a16="http://schemas.microsoft.com/office/drawing/2014/main" id="{E9E57D71-3143-842A-9B00-710374FB1F14}"/>
+              </a:ext>
+            </a:extLst>
+          </p:cNvPr>
+          <p:cNvSpPr txBox="1"/>
+          <p:nvPr/>
+        </p:nvSpPr>
+        <p:spPr>
+          <a:xfrm>
+            <a:off x="259080" y="6468675"/>
+            <a:ext cx="7420424" cy="276999"/>
+          </a:xfrm>
+          <a:prstGeom prst="rect">
+            <a:avLst/>
+          </a:prstGeom>
+          <a:noFill/>
+        </p:spPr>
+        <p:txBody>
+          <a:bodyPr wrap="square">
+            <a:spAutoFit/>
+          </a:bodyPr>
+          <a:lstStyle/>
+          <a:p>
+            <a:pPr>
+              <a:spcAft>
+                <a:spcPts val="600"/>
+              </a:spcAft>
+            </a:pPr>
+            <a:r>
+              <a:rPr lang="en-US" sz="1200" dirty="0"/>
+              <a:t>G. Resto, K. Domenech, C. Roque Adversary Emulation Framework</a:t>
+            </a:r>
+          </a:p>
+        </p:txBody>
+      </p:sp>
+      <p:pic>
+        <p:nvPicPr>
+          <p:cNvPr id="6" name="Picture 5" descr="Graph on document with pen">
+            <a:extLst>
+              <a:ext uri="{FF2B5EF4-FFF2-40B4-BE49-F238E27FC236}">
+                <a16:creationId xmlns:a16="http://schemas.microsoft.com/office/drawing/2014/main" id="{AB14E1A1-F522-9424-EB2E-9534338C458B}"/>
+              </a:ext>
+            </a:extLst>
+          </p:cNvPr>
+          <p:cNvPicPr>
+            <a:picLocks noChangeAspect="1"/>
+          </p:cNvPicPr>
+          <p:nvPr/>
+        </p:nvPicPr>
+        <p:blipFill rotWithShape="1">
+          <a:blip r:embed="rId2"/>
+          <a:srcRect l="27161" r="13438" b="-2"/>
+          <a:stretch/>
+        </p:blipFill>
+        <p:spPr>
+          <a:xfrm>
+            <a:off x="6096000" y="1"/>
+            <a:ext cx="6102825" cy="6858000"/>
+          </a:xfrm>
+          <a:prstGeom prst="rect">
+            <a:avLst/>
+          </a:prstGeom>
+        </p:spPr>
+      </p:pic>
+    </p:spTree>
+    <p:extLst>
+      <p:ext uri="{BB962C8B-B14F-4D97-AF65-F5344CB8AC3E}">
+        <p14:creationId xmlns:p14="http://schemas.microsoft.com/office/powerpoint/2010/main" val="2300167628"/>
+      </p:ext>
+    </p:extLst>
+  </p:cSld>
+  <p:clrMapOvr>
+    <a:masterClrMapping/>
+  </p:clrMapOvr>
+</p:sld>
+</file>
+
+<file path=ppt/slides/slide11.xml><?xml version="1.0" encoding="utf-8"?>
+<p:sld xmlns:a="http://schemas.openxmlformats.org/drawingml/2006/main" xmlns:r="http://schemas.openxmlformats.org/officeDocument/2006/relationships" xmlns:p="http://schemas.openxmlformats.org/presentationml/2006/main">
+  <p:cSld>
+    <p:spTree>
+      <p:nvGrpSpPr>
+        <p:cNvPr id="1" name=""/>
+        <p:cNvGrpSpPr/>
+        <p:nvPr/>
+      </p:nvGrpSpPr>
+      <p:grpSpPr>
+        <a:xfrm>
+          <a:off x="0" y="0"/>
+          <a:ext cx="0" cy="0"/>
+          <a:chOff x="0" y="0"/>
+          <a:chExt cx="0" cy="0"/>
+        </a:xfrm>
+      </p:grpSpPr>
+      <p:sp>
+        <p:nvSpPr>
+          <p:cNvPr id="4" name="Slide Number Placeholder 3">
+            <a:extLst>
+              <a:ext uri="{FF2B5EF4-FFF2-40B4-BE49-F238E27FC236}">
+                <a16:creationId xmlns:a16="http://schemas.microsoft.com/office/drawing/2014/main" id="{41034101-AB2B-C044-B5F1-17C160A4C00B}"/>
+              </a:ext>
+            </a:extLst>
+          </p:cNvPr>
+          <p:cNvSpPr>
+            <a:spLocks noGrp="1"/>
+          </p:cNvSpPr>
+          <p:nvPr>
+            <p:ph type="sldNum" sz="quarter" idx="12"/>
+          </p:nvPr>
+        </p:nvSpPr>
+        <p:spPr/>
+        <p:txBody>
+          <a:bodyPr/>
+          <a:lstStyle/>
+          <a:p>
+            <a:fld id="{A52BEA90-E6BE-45F4-8D5D-C2E01FE3DBCB}" type="slidenum">
+              <a:rPr lang="en-US" smtClean="0"/>
+              <a:pPr/>
+              <a:t>11</a:t>
+            </a:fld>
+            <a:endParaRPr lang="en-US" dirty="0"/>
+          </a:p>
+        </p:txBody>
+      </p:sp>
+      <p:pic>
+        <p:nvPicPr>
+          <p:cNvPr id="6" name="Picture 5">
+            <a:extLst>
+              <a:ext uri="{FF2B5EF4-FFF2-40B4-BE49-F238E27FC236}">
+                <a16:creationId xmlns:a16="http://schemas.microsoft.com/office/drawing/2014/main" id="{307EDC3E-3B61-CC1B-E995-33D246E9B429}"/>
+              </a:ext>
+            </a:extLst>
+          </p:cNvPr>
+          <p:cNvPicPr>
+            <a:picLocks noChangeAspect="1"/>
+          </p:cNvPicPr>
+          <p:nvPr/>
+        </p:nvPicPr>
+        <p:blipFill>
+          <a:blip r:embed="rId2">
+            <a:extLst>
+              <a:ext uri="{28A0092B-C50C-407E-A947-70E740481C1C}">
+                <a14:useLocalDpi xmlns:a14="http://schemas.microsoft.com/office/drawing/2010/main" val="0"/>
+              </a:ext>
+            </a:extLst>
+          </a:blip>
+          <a:stretch>
+            <a:fillRect/>
+          </a:stretch>
+        </p:blipFill>
+        <p:spPr>
+          <a:xfrm>
+            <a:off x="1" y="0"/>
+            <a:ext cx="12192000" cy="6858000"/>
+          </a:xfrm>
+          <a:prstGeom prst="rect">
+            <a:avLst/>
+          </a:prstGeom>
+        </p:spPr>
+      </p:pic>
+    </p:spTree>
+    <p:extLst>
+      <p:ext uri="{BB962C8B-B14F-4D97-AF65-F5344CB8AC3E}">
+        <p14:creationId xmlns:p14="http://schemas.microsoft.com/office/powerpoint/2010/main" val="3496558179"/>
+      </p:ext>
+    </p:extLst>
+  </p:cSld>
+  <p:clrMapOvr>
+    <a:masterClrMapping/>
+  </p:clrMapOvr>
+</p:sld>
+</file>
+
+<file path=ppt/slides/slide12.xml><?xml version="1.0" encoding="utf-8"?>
+<p:sld xmlns:a="http://schemas.openxmlformats.org/drawingml/2006/main" xmlns:r="http://schemas.openxmlformats.org/officeDocument/2006/relationships" xmlns:p="http://schemas.openxmlformats.org/presentationml/2006/main">
+  <p:cSld>
+    <p:bg>
+      <p:bgPr>
+        <a:solidFill>
+          <a:schemeClr val="bg1"/>
+        </a:solidFill>
+        <a:effectLst/>
+      </p:bgPr>
+    </p:bg>
+    <p:spTree>
+      <p:nvGrpSpPr>
+        <p:cNvPr id="1" name=""/>
+        <p:cNvGrpSpPr/>
+        <p:nvPr/>
+      </p:nvGrpSpPr>
+      <p:grpSpPr>
+        <a:xfrm>
+          <a:off x="0" y="0"/>
+          <a:ext cx="0" cy="0"/>
+          <a:chOff x="0" y="0"/>
+          <a:chExt cx="0" cy="0"/>
+        </a:xfrm>
+      </p:grpSpPr>
       <p:sp>
         <p:nvSpPr>
           <p:cNvPr id="2" name="Title 1">
@@ -4705,7 +5269,7 @@
                   <a:spcPts val="600"/>
                 </a:spcAft>
               </a:pPr>
-              <a:t>10</a:t>
+              <a:t>12</a:t>
             </a:fld>
             <a:endParaRPr lang="en-US"/>
           </a:p>
@@ -4787,6 +5351,46 @@
           </a:prstGeom>
         </p:spPr>
       </p:pic>
+      <p:sp>
+        <p:nvSpPr>
+          <p:cNvPr id="5" name="TextBox 4">
+            <a:extLst>
+              <a:ext uri="{FF2B5EF4-FFF2-40B4-BE49-F238E27FC236}">
+                <a16:creationId xmlns:a16="http://schemas.microsoft.com/office/drawing/2014/main" id="{D7E6A275-C316-75E5-5F7B-FFC114EDFADF}"/>
+              </a:ext>
+            </a:extLst>
+          </p:cNvPr>
+          <p:cNvSpPr txBox="1"/>
+          <p:nvPr/>
+        </p:nvSpPr>
+        <p:spPr>
+          <a:xfrm>
+            <a:off x="402243" y="6444476"/>
+            <a:ext cx="7420424" cy="276999"/>
+          </a:xfrm>
+          <a:prstGeom prst="rect">
+            <a:avLst/>
+          </a:prstGeom>
+          <a:noFill/>
+        </p:spPr>
+        <p:txBody>
+          <a:bodyPr wrap="square">
+            <a:spAutoFit/>
+          </a:bodyPr>
+          <a:lstStyle/>
+          <a:p>
+            <a:pPr>
+              <a:spcAft>
+                <a:spcPts val="600"/>
+              </a:spcAft>
+            </a:pPr>
+            <a:r>
+              <a:rPr lang="en-US" sz="1200" dirty="0"/>
+              <a:t>G. Resto, K. Domenech, C. Roque Adversary Emulation Framework</a:t>
+            </a:r>
+          </a:p>
+        </p:txBody>
+      </p:sp>
     </p:spTree>
     <p:extLst>
       <p:ext uri="{BB962C8B-B14F-4D97-AF65-F5344CB8AC3E}">
@@ -4800,7 +5404,7 @@
 </p:sld>
 </file>
 
-<file path=ppt/slides/slide11.xml><?xml version="1.0" encoding="utf-8"?>
+<file path=ppt/slides/slide13.xml><?xml version="1.0" encoding="utf-8"?>
 <p:sld xmlns:a="http://schemas.openxmlformats.org/drawingml/2006/main" xmlns:r="http://schemas.openxmlformats.org/officeDocument/2006/relationships" xmlns:p="http://schemas.openxmlformats.org/presentationml/2006/main">
   <p:cSld>
     <p:bg>
@@ -5153,7 +5757,7 @@
                   <a:spcPts val="600"/>
                 </a:spcAft>
               </a:pPr>
-              <a:t>11</a:t>
+              <a:t>13</a:t>
             </a:fld>
             <a:endParaRPr lang="en-US">
               <a:solidFill>
@@ -5176,7 +5780,7 @@
 </p:sld>
 </file>
 
-<file path=ppt/slides/slide12.xml><?xml version="1.0" encoding="utf-8"?>
+<file path=ppt/slides/slide14.xml><?xml version="1.0" encoding="utf-8"?>
 <p:sld xmlns:a="http://schemas.openxmlformats.org/drawingml/2006/main" xmlns:r="http://schemas.openxmlformats.org/officeDocument/2006/relationships" xmlns:p="http://schemas.openxmlformats.org/presentationml/2006/main">
   <p:cSld>
     <p:bg>
@@ -5298,12 +5902,12 @@
           <a:p>
             <a:pPr algn="ctr"/>
             <a:r>
-              <a:rPr lang="en-US" sz="3600">
+              <a:rPr lang="en-US" sz="3600" dirty="0">
                 <a:solidFill>
                   <a:srgbClr val="FFFFFF"/>
                 </a:solidFill>
               </a:rPr>
-              <a:t>Implant Execution</a:t>
+              <a:t>Implant Loading</a:t>
             </a:r>
           </a:p>
         </p:txBody>
@@ -5384,15 +5988,55 @@
                   <a:spcPts val="600"/>
                 </a:spcAft>
               </a:pPr>
-              <a:t>12</a:t>
+              <a:t>14</a:t>
             </a:fld>
-            <a:endParaRPr lang="en-US">
+            <a:endParaRPr lang="en-US" dirty="0">
               <a:solidFill>
                 <a:schemeClr val="tx1">
                   <a:alpha val="80000"/>
                 </a:schemeClr>
               </a:solidFill>
             </a:endParaRPr>
+          </a:p>
+        </p:txBody>
+      </p:sp>
+      <p:sp>
+        <p:nvSpPr>
+          <p:cNvPr id="4" name="TextBox 3">
+            <a:extLst>
+              <a:ext uri="{FF2B5EF4-FFF2-40B4-BE49-F238E27FC236}">
+                <a16:creationId xmlns:a16="http://schemas.microsoft.com/office/drawing/2014/main" id="{F552152D-0CAD-D0C0-49F2-D2608C6F8956}"/>
+              </a:ext>
+            </a:extLst>
+          </p:cNvPr>
+          <p:cNvSpPr txBox="1"/>
+          <p:nvPr/>
+        </p:nvSpPr>
+        <p:spPr>
+          <a:xfrm>
+            <a:off x="261567" y="6444476"/>
+            <a:ext cx="7420424" cy="276999"/>
+          </a:xfrm>
+          <a:prstGeom prst="rect">
+            <a:avLst/>
+          </a:prstGeom>
+          <a:noFill/>
+        </p:spPr>
+        <p:txBody>
+          <a:bodyPr wrap="square">
+            <a:spAutoFit/>
+          </a:bodyPr>
+          <a:lstStyle/>
+          <a:p>
+            <a:pPr>
+              <a:spcAft>
+                <a:spcPts val="600"/>
+              </a:spcAft>
+            </a:pPr>
+            <a:r>
+              <a:rPr lang="en-US" sz="1200" dirty="0"/>
+              <a:t>G. Resto, K. Domenech, C. Roque Adversary Emulation Framework</a:t>
+            </a:r>
           </a:p>
         </p:txBody>
       </p:sp>
@@ -5409,7 +6053,240 @@
 </p:sld>
 </file>
 
-<file path=ppt/slides/slide13.xml><?xml version="1.0" encoding="utf-8"?>
+<file path=ppt/slides/slide15.xml><?xml version="1.0" encoding="utf-8"?>
+<p:sld xmlns:a="http://schemas.openxmlformats.org/drawingml/2006/main" xmlns:r="http://schemas.openxmlformats.org/officeDocument/2006/relationships" xmlns:p="http://schemas.openxmlformats.org/presentationml/2006/main">
+  <p:cSld>
+    <p:bg>
+      <p:bgPr>
+        <a:solidFill>
+          <a:schemeClr val="bg1"/>
+        </a:solidFill>
+        <a:effectLst/>
+      </p:bgPr>
+    </p:bg>
+    <p:spTree>
+      <p:nvGrpSpPr>
+        <p:cNvPr id="1" name=""/>
+        <p:cNvGrpSpPr/>
+        <p:nvPr/>
+      </p:nvGrpSpPr>
+      <p:grpSpPr>
+        <a:xfrm>
+          <a:off x="0" y="0"/>
+          <a:ext cx="0" cy="0"/>
+          <a:chOff x="0" y="0"/>
+          <a:chExt cx="0" cy="0"/>
+        </a:xfrm>
+      </p:grpSpPr>
+      <p:sp>
+        <p:nvSpPr>
+          <p:cNvPr id="10" name="Down Arrow 7">
+            <a:extLst>
+              <a:ext uri="{FF2B5EF4-FFF2-40B4-BE49-F238E27FC236}">
+                <a16:creationId xmlns:a16="http://schemas.microsoft.com/office/drawing/2014/main" id="{D4771268-CB57-404A-9271-370EB28F6090}"/>
+              </a:ext>
+              <a:ext uri="{C183D7F6-B498-43B3-948B-1728B52AA6E4}">
+                <adec:decorative xmlns:adec="http://schemas.microsoft.com/office/drawing/2017/decorative" val="1"/>
+              </a:ext>
+            </a:extLst>
+          </p:cNvPr>
+          <p:cNvSpPr>
+            <a:spLocks noGrp="1" noRot="1" noChangeAspect="1" noMove="1" noResize="1" noEditPoints="1" noAdjustHandles="1" noChangeArrowheads="1" noChangeShapeType="1" noTextEdit="1"/>
+          </p:cNvSpPr>
+          <p:nvPr>
+            <p:extLst>
+              <p:ext uri="{386F3935-93C4-4BCD-93E2-E3B085C9AB24}">
+                <p16:designElem xmlns:p16="http://schemas.microsoft.com/office/powerpoint/2015/main" val="1"/>
+              </p:ext>
+            </p:extLst>
+          </p:nvPr>
+        </p:nvSpPr>
+        <p:spPr>
+          <a:xfrm rot="16200000">
+            <a:off x="800100" y="1491343"/>
+            <a:ext cx="3333749" cy="3499103"/>
+          </a:xfrm>
+          <a:prstGeom prst="downArrow">
+            <a:avLst>
+              <a:gd name="adj1" fmla="val 100000"/>
+              <a:gd name="adj2" fmla="val 15788"/>
+            </a:avLst>
+          </a:prstGeom>
+          <a:solidFill>
+            <a:srgbClr val="404040"/>
+          </a:solidFill>
+          <a:ln w="53975">
+            <a:noFill/>
+          </a:ln>
+        </p:spPr>
+        <p:style>
+          <a:lnRef idx="2">
+            <a:schemeClr val="accent1">
+              <a:shade val="50000"/>
+            </a:schemeClr>
+          </a:lnRef>
+          <a:fillRef idx="1">
+            <a:schemeClr val="accent1"/>
+          </a:fillRef>
+          <a:effectRef idx="0">
+            <a:schemeClr val="accent1"/>
+          </a:effectRef>
+          <a:fontRef idx="minor">
+            <a:schemeClr val="lt1"/>
+          </a:fontRef>
+        </p:style>
+        <p:txBody>
+          <a:bodyPr rtlCol="0" anchor="ctr"/>
+          <a:lstStyle/>
+          <a:p>
+            <a:pPr algn="ctr"/>
+            <a:endParaRPr lang="en-US"/>
+          </a:p>
+        </p:txBody>
+      </p:sp>
+      <p:sp>
+        <p:nvSpPr>
+          <p:cNvPr id="2" name="Title 1">
+            <a:extLst>
+              <a:ext uri="{FF2B5EF4-FFF2-40B4-BE49-F238E27FC236}">
+                <a16:creationId xmlns:a16="http://schemas.microsoft.com/office/drawing/2014/main" id="{C10B8A11-005D-9C80-082A-88CACAC2A38E}"/>
+              </a:ext>
+            </a:extLst>
+          </p:cNvPr>
+          <p:cNvSpPr>
+            <a:spLocks noGrp="1"/>
+          </p:cNvSpPr>
+          <p:nvPr>
+            <p:ph type="title"/>
+          </p:nvPr>
+        </p:nvSpPr>
+        <p:spPr>
+          <a:xfrm>
+            <a:off x="1028700" y="1967266"/>
+            <a:ext cx="2628900" cy="2547257"/>
+          </a:xfrm>
+          <a:noFill/>
+        </p:spPr>
+        <p:txBody>
+          <a:bodyPr anchor="ctr">
+            <a:normAutofit/>
+          </a:bodyPr>
+          <a:lstStyle/>
+          <a:p>
+            <a:pPr algn="ctr"/>
+            <a:r>
+              <a:rPr lang="en-US" sz="3600" dirty="0">
+                <a:solidFill>
+                  <a:srgbClr val="FFFFFF"/>
+                </a:solidFill>
+              </a:rPr>
+              <a:t>Listeners Creation</a:t>
+            </a:r>
+          </a:p>
+        </p:txBody>
+      </p:sp>
+      <p:pic>
+        <p:nvPicPr>
+          <p:cNvPr id="5" name="Picture 4">
+            <a:extLst>
+              <a:ext uri="{FF2B5EF4-FFF2-40B4-BE49-F238E27FC236}">
+                <a16:creationId xmlns:a16="http://schemas.microsoft.com/office/drawing/2014/main" id="{CBA62399-B193-BAF7-FC38-D0C405681403}"/>
+              </a:ext>
+            </a:extLst>
+          </p:cNvPr>
+          <p:cNvPicPr>
+            <a:picLocks noChangeAspect="1"/>
+          </p:cNvPicPr>
+          <p:nvPr/>
+        </p:nvPicPr>
+        <p:blipFill>
+          <a:blip r:embed="rId2"/>
+          <a:stretch>
+            <a:fillRect/>
+          </a:stretch>
+        </p:blipFill>
+        <p:spPr>
+          <a:xfrm>
+            <a:off x="4792673" y="643466"/>
+            <a:ext cx="6749986" cy="5568739"/>
+          </a:xfrm>
+          <a:prstGeom prst="rect">
+            <a:avLst/>
+          </a:prstGeom>
+        </p:spPr>
+      </p:pic>
+      <p:sp>
+        <p:nvSpPr>
+          <p:cNvPr id="3" name="Slide Number Placeholder 2">
+            <a:extLst>
+              <a:ext uri="{FF2B5EF4-FFF2-40B4-BE49-F238E27FC236}">
+                <a16:creationId xmlns:a16="http://schemas.microsoft.com/office/drawing/2014/main" id="{25DAE628-6065-AD40-C7CD-84123B6D87E1}"/>
+              </a:ext>
+            </a:extLst>
+          </p:cNvPr>
+          <p:cNvSpPr>
+            <a:spLocks noGrp="1"/>
+          </p:cNvSpPr>
+          <p:nvPr>
+            <p:ph type="sldNum" sz="quarter" idx="12"/>
+          </p:nvPr>
+        </p:nvSpPr>
+        <p:spPr>
+          <a:xfrm>
+            <a:off x="11034184" y="6356350"/>
+            <a:ext cx="514349" cy="365125"/>
+          </a:xfrm>
+        </p:spPr>
+        <p:txBody>
+          <a:bodyPr>
+            <a:normAutofit/>
+          </a:bodyPr>
+          <a:lstStyle/>
+          <a:p>
+            <a:pPr>
+              <a:spcAft>
+                <a:spcPts val="600"/>
+              </a:spcAft>
+            </a:pPr>
+            <a:fld id="{A52BEA90-E6BE-45F4-8D5D-C2E01FE3DBCB}" type="slidenum">
+              <a:rPr lang="en-US">
+                <a:solidFill>
+                  <a:schemeClr val="tx1">
+                    <a:alpha val="80000"/>
+                  </a:schemeClr>
+                </a:solidFill>
+              </a:rPr>
+              <a:pPr>
+                <a:spcAft>
+                  <a:spcPts val="600"/>
+                </a:spcAft>
+              </a:pPr>
+              <a:t>15</a:t>
+            </a:fld>
+            <a:endParaRPr lang="en-US">
+              <a:solidFill>
+                <a:schemeClr val="tx1">
+                  <a:alpha val="80000"/>
+                </a:schemeClr>
+              </a:solidFill>
+            </a:endParaRPr>
+          </a:p>
+        </p:txBody>
+      </p:sp>
+    </p:spTree>
+    <p:extLst>
+      <p:ext uri="{BB962C8B-B14F-4D97-AF65-F5344CB8AC3E}">
+        <p14:creationId xmlns:p14="http://schemas.microsoft.com/office/powerpoint/2010/main" val="3202153900"/>
+      </p:ext>
+    </p:extLst>
+  </p:cSld>
+  <p:clrMapOvr>
+    <a:masterClrMapping/>
+  </p:clrMapOvr>
+</p:sld>
+</file>
+
+<file path=ppt/slides/slide16.xml><?xml version="1.0" encoding="utf-8"?>
 <p:sld xmlns:a="http://schemas.openxmlformats.org/drawingml/2006/main" xmlns:r="http://schemas.openxmlformats.org/officeDocument/2006/relationships" xmlns:p="http://schemas.openxmlformats.org/presentationml/2006/main">
   <p:cSld>
     <p:spTree>
@@ -5968,6 +6845,159 @@
           </a:p>
         </p:txBody>
       </p:sp>
+      <p:sp>
+        <p:nvSpPr>
+          <p:cNvPr id="2" name="Slide Number Placeholder 2">
+            <a:extLst>
+              <a:ext uri="{FF2B5EF4-FFF2-40B4-BE49-F238E27FC236}">
+                <a16:creationId xmlns:a16="http://schemas.microsoft.com/office/drawing/2014/main" id="{AB547824-BB07-8384-CE60-3D2EAB59EFBB}"/>
+              </a:ext>
+            </a:extLst>
+          </p:cNvPr>
+          <p:cNvSpPr txBox="1">
+            <a:spLocks/>
+          </p:cNvSpPr>
+          <p:nvPr/>
+        </p:nvSpPr>
+        <p:spPr>
+          <a:xfrm>
+            <a:off x="11034184" y="6356350"/>
+            <a:ext cx="514349" cy="365125"/>
+          </a:xfrm>
+          <a:prstGeom prst="rect">
+            <a:avLst/>
+          </a:prstGeom>
+        </p:spPr>
+        <p:txBody>
+          <a:bodyPr>
+            <a:normAutofit lnSpcReduction="10000"/>
+          </a:bodyPr>
+          <a:lstStyle>
+            <a:defPPr>
+              <a:defRPr lang="en-US"/>
+            </a:defPPr>
+            <a:lvl1pPr marL="0" algn="l" defTabSz="914400" rtl="0" eaLnBrk="1" latinLnBrk="0" hangingPunct="1">
+              <a:defRPr sz="1800" kern="1200">
+                <a:solidFill>
+                  <a:schemeClr val="tx1"/>
+                </a:solidFill>
+                <a:latin typeface="+mn-lt"/>
+                <a:ea typeface="+mn-ea"/>
+                <a:cs typeface="+mn-cs"/>
+              </a:defRPr>
+            </a:lvl1pPr>
+            <a:lvl2pPr marL="457200" algn="l" defTabSz="914400" rtl="0" eaLnBrk="1" latinLnBrk="0" hangingPunct="1">
+              <a:defRPr sz="1800" kern="1200">
+                <a:solidFill>
+                  <a:schemeClr val="tx1"/>
+                </a:solidFill>
+                <a:latin typeface="+mn-lt"/>
+                <a:ea typeface="+mn-ea"/>
+                <a:cs typeface="+mn-cs"/>
+              </a:defRPr>
+            </a:lvl2pPr>
+            <a:lvl3pPr marL="914400" algn="l" defTabSz="914400" rtl="0" eaLnBrk="1" latinLnBrk="0" hangingPunct="1">
+              <a:defRPr sz="1800" kern="1200">
+                <a:solidFill>
+                  <a:schemeClr val="tx1"/>
+                </a:solidFill>
+                <a:latin typeface="+mn-lt"/>
+                <a:ea typeface="+mn-ea"/>
+                <a:cs typeface="+mn-cs"/>
+              </a:defRPr>
+            </a:lvl3pPr>
+            <a:lvl4pPr marL="1371600" algn="l" defTabSz="914400" rtl="0" eaLnBrk="1" latinLnBrk="0" hangingPunct="1">
+              <a:defRPr sz="1800" kern="1200">
+                <a:solidFill>
+                  <a:schemeClr val="tx1"/>
+                </a:solidFill>
+                <a:latin typeface="+mn-lt"/>
+                <a:ea typeface="+mn-ea"/>
+                <a:cs typeface="+mn-cs"/>
+              </a:defRPr>
+            </a:lvl4pPr>
+            <a:lvl5pPr marL="1828800" algn="l" defTabSz="914400" rtl="0" eaLnBrk="1" latinLnBrk="0" hangingPunct="1">
+              <a:defRPr sz="1800" kern="1200">
+                <a:solidFill>
+                  <a:schemeClr val="tx1"/>
+                </a:solidFill>
+                <a:latin typeface="+mn-lt"/>
+                <a:ea typeface="+mn-ea"/>
+                <a:cs typeface="+mn-cs"/>
+              </a:defRPr>
+            </a:lvl5pPr>
+            <a:lvl6pPr marL="2286000" algn="l" defTabSz="914400" rtl="0" eaLnBrk="1" latinLnBrk="0" hangingPunct="1">
+              <a:defRPr sz="1800" kern="1200">
+                <a:solidFill>
+                  <a:schemeClr val="tx1"/>
+                </a:solidFill>
+                <a:latin typeface="+mn-lt"/>
+                <a:ea typeface="+mn-ea"/>
+                <a:cs typeface="+mn-cs"/>
+              </a:defRPr>
+            </a:lvl6pPr>
+            <a:lvl7pPr marL="2743200" algn="l" defTabSz="914400" rtl="0" eaLnBrk="1" latinLnBrk="0" hangingPunct="1">
+              <a:defRPr sz="1800" kern="1200">
+                <a:solidFill>
+                  <a:schemeClr val="tx1"/>
+                </a:solidFill>
+                <a:latin typeface="+mn-lt"/>
+                <a:ea typeface="+mn-ea"/>
+                <a:cs typeface="+mn-cs"/>
+              </a:defRPr>
+            </a:lvl7pPr>
+            <a:lvl8pPr marL="3200400" algn="l" defTabSz="914400" rtl="0" eaLnBrk="1" latinLnBrk="0" hangingPunct="1">
+              <a:defRPr sz="1800" kern="1200">
+                <a:solidFill>
+                  <a:schemeClr val="tx1"/>
+                </a:solidFill>
+                <a:latin typeface="+mn-lt"/>
+                <a:ea typeface="+mn-ea"/>
+                <a:cs typeface="+mn-cs"/>
+              </a:defRPr>
+            </a:lvl8pPr>
+            <a:lvl9pPr marL="3657600" algn="l" defTabSz="914400" rtl="0" eaLnBrk="1" latinLnBrk="0" hangingPunct="1">
+              <a:defRPr sz="1800" kern="1200">
+                <a:solidFill>
+                  <a:schemeClr val="tx1"/>
+                </a:solidFill>
+                <a:latin typeface="+mn-lt"/>
+                <a:ea typeface="+mn-ea"/>
+                <a:cs typeface="+mn-cs"/>
+              </a:defRPr>
+            </a:lvl9pPr>
+          </a:lstStyle>
+          <a:p>
+            <a:pPr>
+              <a:spcAft>
+                <a:spcPts val="600"/>
+              </a:spcAft>
+            </a:pPr>
+            <a:fld id="{A52BEA90-E6BE-45F4-8D5D-C2E01FE3DBCB}" type="slidenum">
+              <a:rPr lang="en-US" smtClean="0">
+                <a:solidFill>
+                  <a:schemeClr val="tx1">
+                    <a:alpha val="80000"/>
+                  </a:schemeClr>
+                </a:solidFill>
+              </a:rPr>
+              <a:pPr>
+                <a:spcAft>
+                  <a:spcPts val="600"/>
+                </a:spcAft>
+              </a:pPr>
+              <a:t>16</a:t>
+            </a:fld>
+            <a:endParaRPr lang="en-US" dirty="0">
+              <a:solidFill>
+                <a:schemeClr val="tx1">
+                  <a:alpha val="80000"/>
+                </a:schemeClr>
+              </a:solidFill>
+            </a:endParaRPr>
+          </a:p>
+        </p:txBody>
+      </p:sp>
     </p:spTree>
     <p:extLst>
       <p:ext uri="{BB962C8B-B14F-4D97-AF65-F5344CB8AC3E}">
@@ -5981,7 +7011,7 @@
 </p:sld>
 </file>
 
-<file path=ppt/slides/slide14.xml><?xml version="1.0" encoding="utf-8"?>
+<file path=ppt/slides/slide17.xml><?xml version="1.0" encoding="utf-8"?>
 <p:sld xmlns:a="http://schemas.openxmlformats.org/drawingml/2006/main" xmlns:r="http://schemas.openxmlformats.org/officeDocument/2006/relationships" xmlns:p="http://schemas.openxmlformats.org/presentationml/2006/main">
   <p:cSld>
     <p:spTree>
@@ -8299,7 +9329,7 @@
           </a:bodyPr>
           <a:lstStyle/>
           <a:p>
-            <a:pPr marL="285750" indent="-228600">
+            <a:pPr marL="857250" lvl="1" indent="-342900">
               <a:lnSpc>
                 <a:spcPct val="90000"/>
               </a:lnSpc>
@@ -8311,11 +9341,11 @@
             </a:pPr>
             <a:r>
               <a:rPr lang="en-US" sz="2000" dirty="0"/>
-              <a:t>Solution</a:t>
+              <a:t>Command and Control Framework (C2) and Structure Diagram context</a:t>
             </a:r>
           </a:p>
           <a:p>
-            <a:pPr marL="742950" lvl="1" indent="-228600">
+            <a:pPr marL="857250" lvl="1" indent="-342900">
               <a:lnSpc>
                 <a:spcPct val="90000"/>
               </a:lnSpc>
@@ -8327,11 +9357,11 @@
             </a:pPr>
             <a:r>
               <a:rPr lang="en-US" sz="2000" dirty="0"/>
-              <a:t>Command and Control Framework (C2)</a:t>
+              <a:t>Project Improvements: Implant, Server and Interface</a:t>
             </a:r>
           </a:p>
           <a:p>
-            <a:pPr marL="742950" lvl="1" indent="-228600">
+            <a:pPr marL="857250" lvl="1" indent="-342900">
               <a:lnSpc>
                 <a:spcPct val="90000"/>
               </a:lnSpc>
@@ -8343,11 +9373,11 @@
             </a:pPr>
             <a:r>
               <a:rPr lang="en-US" sz="2000" dirty="0"/>
-              <a:t>Structure Diagram</a:t>
+              <a:t>Diagrams: Implant and Listeners tab</a:t>
             </a:r>
           </a:p>
           <a:p>
-            <a:pPr marL="285750" indent="-228600">
+            <a:pPr marL="857250" lvl="1" indent="-342900">
               <a:lnSpc>
                 <a:spcPct val="90000"/>
               </a:lnSpc>
@@ -8363,7 +9393,7 @@
             </a:r>
           </a:p>
           <a:p>
-            <a:pPr marL="285750" indent="-228600">
+            <a:pPr marL="857250" lvl="1" indent="-342900">
               <a:lnSpc>
                 <a:spcPct val="90000"/>
               </a:lnSpc>
@@ -9671,6 +10701,147 @@
           </a:p>
         </p:txBody>
       </p:sp>
+      <p:sp>
+        <p:nvSpPr>
+          <p:cNvPr id="2" name="Slide Number Placeholder 2">
+            <a:extLst>
+              <a:ext uri="{FF2B5EF4-FFF2-40B4-BE49-F238E27FC236}">
+                <a16:creationId xmlns:a16="http://schemas.microsoft.com/office/drawing/2014/main" id="{513847D1-FD9B-1358-E13B-97E6F75B15AA}"/>
+              </a:ext>
+            </a:extLst>
+          </p:cNvPr>
+          <p:cNvSpPr txBox="1">
+            <a:spLocks/>
+          </p:cNvSpPr>
+          <p:nvPr/>
+        </p:nvSpPr>
+        <p:spPr>
+          <a:xfrm>
+            <a:off x="11034184" y="6356350"/>
+            <a:ext cx="514349" cy="365125"/>
+          </a:xfrm>
+          <a:prstGeom prst="rect">
+            <a:avLst/>
+          </a:prstGeom>
+        </p:spPr>
+        <p:txBody>
+          <a:bodyPr>
+            <a:normAutofit lnSpcReduction="10000"/>
+          </a:bodyPr>
+          <a:lstStyle>
+            <a:defPPr>
+              <a:defRPr lang="en-US"/>
+            </a:defPPr>
+            <a:lvl1pPr marL="0" algn="l" defTabSz="914400" rtl="0" eaLnBrk="1" latinLnBrk="0" hangingPunct="1">
+              <a:defRPr sz="1800" kern="1200">
+                <a:solidFill>
+                  <a:schemeClr val="tx1"/>
+                </a:solidFill>
+                <a:latin typeface="+mn-lt"/>
+                <a:ea typeface="+mn-ea"/>
+                <a:cs typeface="+mn-cs"/>
+              </a:defRPr>
+            </a:lvl1pPr>
+            <a:lvl2pPr marL="457200" algn="l" defTabSz="914400" rtl="0" eaLnBrk="1" latinLnBrk="0" hangingPunct="1">
+              <a:defRPr sz="1800" kern="1200">
+                <a:solidFill>
+                  <a:schemeClr val="tx1"/>
+                </a:solidFill>
+                <a:latin typeface="+mn-lt"/>
+                <a:ea typeface="+mn-ea"/>
+                <a:cs typeface="+mn-cs"/>
+              </a:defRPr>
+            </a:lvl2pPr>
+            <a:lvl3pPr marL="914400" algn="l" defTabSz="914400" rtl="0" eaLnBrk="1" latinLnBrk="0" hangingPunct="1">
+              <a:defRPr sz="1800" kern="1200">
+                <a:solidFill>
+                  <a:schemeClr val="tx1"/>
+                </a:solidFill>
+                <a:latin typeface="+mn-lt"/>
+                <a:ea typeface="+mn-ea"/>
+                <a:cs typeface="+mn-cs"/>
+              </a:defRPr>
+            </a:lvl3pPr>
+            <a:lvl4pPr marL="1371600" algn="l" defTabSz="914400" rtl="0" eaLnBrk="1" latinLnBrk="0" hangingPunct="1">
+              <a:defRPr sz="1800" kern="1200">
+                <a:solidFill>
+                  <a:schemeClr val="tx1"/>
+                </a:solidFill>
+                <a:latin typeface="+mn-lt"/>
+                <a:ea typeface="+mn-ea"/>
+                <a:cs typeface="+mn-cs"/>
+              </a:defRPr>
+            </a:lvl4pPr>
+            <a:lvl5pPr marL="1828800" algn="l" defTabSz="914400" rtl="0" eaLnBrk="1" latinLnBrk="0" hangingPunct="1">
+              <a:defRPr sz="1800" kern="1200">
+                <a:solidFill>
+                  <a:schemeClr val="tx1"/>
+                </a:solidFill>
+                <a:latin typeface="+mn-lt"/>
+                <a:ea typeface="+mn-ea"/>
+                <a:cs typeface="+mn-cs"/>
+              </a:defRPr>
+            </a:lvl5pPr>
+            <a:lvl6pPr marL="2286000" algn="l" defTabSz="914400" rtl="0" eaLnBrk="1" latinLnBrk="0" hangingPunct="1">
+              <a:defRPr sz="1800" kern="1200">
+                <a:solidFill>
+                  <a:schemeClr val="tx1"/>
+                </a:solidFill>
+                <a:latin typeface="+mn-lt"/>
+                <a:ea typeface="+mn-ea"/>
+                <a:cs typeface="+mn-cs"/>
+              </a:defRPr>
+            </a:lvl6pPr>
+            <a:lvl7pPr marL="2743200" algn="l" defTabSz="914400" rtl="0" eaLnBrk="1" latinLnBrk="0" hangingPunct="1">
+              <a:defRPr sz="1800" kern="1200">
+                <a:solidFill>
+                  <a:schemeClr val="tx1"/>
+                </a:solidFill>
+                <a:latin typeface="+mn-lt"/>
+                <a:ea typeface="+mn-ea"/>
+                <a:cs typeface="+mn-cs"/>
+              </a:defRPr>
+            </a:lvl7pPr>
+            <a:lvl8pPr marL="3200400" algn="l" defTabSz="914400" rtl="0" eaLnBrk="1" latinLnBrk="0" hangingPunct="1">
+              <a:defRPr sz="1800" kern="1200">
+                <a:solidFill>
+                  <a:schemeClr val="tx1"/>
+                </a:solidFill>
+                <a:latin typeface="+mn-lt"/>
+                <a:ea typeface="+mn-ea"/>
+                <a:cs typeface="+mn-cs"/>
+              </a:defRPr>
+            </a:lvl8pPr>
+            <a:lvl9pPr marL="3657600" algn="l" defTabSz="914400" rtl="0" eaLnBrk="1" latinLnBrk="0" hangingPunct="1">
+              <a:defRPr sz="1800" kern="1200">
+                <a:solidFill>
+                  <a:schemeClr val="tx1"/>
+                </a:solidFill>
+                <a:latin typeface="+mn-lt"/>
+                <a:ea typeface="+mn-ea"/>
+                <a:cs typeface="+mn-cs"/>
+              </a:defRPr>
+            </a:lvl9pPr>
+          </a:lstStyle>
+          <a:p>
+            <a:pPr>
+              <a:spcAft>
+                <a:spcPts val="600"/>
+              </a:spcAft>
+            </a:pPr>
+            <a:r>
+              <a:rPr lang="en-US" dirty="0">
+                <a:solidFill>
+                  <a:schemeClr val="tx1">
+                    <a:alpha val="80000"/>
+                  </a:schemeClr>
+                </a:solidFill>
+              </a:rPr>
+              <a:t>2</a:t>
+            </a:r>
+          </a:p>
+        </p:txBody>
+      </p:sp>
     </p:spTree>
     <p:extLst>
       <p:ext uri="{BB962C8B-B14F-4D97-AF65-F5344CB8AC3E}">
@@ -9861,7 +11032,7 @@
                 <a:ea typeface="+mj-ea"/>
                 <a:cs typeface="+mj-cs"/>
               </a:rPr>
-              <a:t>Solutions</a:t>
+              <a:t>Project Context</a:t>
             </a:r>
           </a:p>
         </p:txBody>
@@ -12020,6 +13191,159 @@
           </a:p>
         </p:txBody>
       </p:sp>
+      <p:sp>
+        <p:nvSpPr>
+          <p:cNvPr id="2" name="Slide Number Placeholder 2">
+            <a:extLst>
+              <a:ext uri="{FF2B5EF4-FFF2-40B4-BE49-F238E27FC236}">
+                <a16:creationId xmlns:a16="http://schemas.microsoft.com/office/drawing/2014/main" id="{506D4C89-DB40-26D9-CF06-A0267FB3C9E1}"/>
+              </a:ext>
+            </a:extLst>
+          </p:cNvPr>
+          <p:cNvSpPr txBox="1">
+            <a:spLocks/>
+          </p:cNvSpPr>
+          <p:nvPr/>
+        </p:nvSpPr>
+        <p:spPr>
+          <a:xfrm>
+            <a:off x="11034184" y="6356350"/>
+            <a:ext cx="514349" cy="365125"/>
+          </a:xfrm>
+          <a:prstGeom prst="rect">
+            <a:avLst/>
+          </a:prstGeom>
+        </p:spPr>
+        <p:txBody>
+          <a:bodyPr>
+            <a:normAutofit lnSpcReduction="10000"/>
+          </a:bodyPr>
+          <a:lstStyle>
+            <a:defPPr>
+              <a:defRPr lang="en-US"/>
+            </a:defPPr>
+            <a:lvl1pPr marL="0" algn="l" defTabSz="914400" rtl="0" eaLnBrk="1" latinLnBrk="0" hangingPunct="1">
+              <a:defRPr sz="1800" kern="1200">
+                <a:solidFill>
+                  <a:schemeClr val="tx1"/>
+                </a:solidFill>
+                <a:latin typeface="+mn-lt"/>
+                <a:ea typeface="+mn-ea"/>
+                <a:cs typeface="+mn-cs"/>
+              </a:defRPr>
+            </a:lvl1pPr>
+            <a:lvl2pPr marL="457200" algn="l" defTabSz="914400" rtl="0" eaLnBrk="1" latinLnBrk="0" hangingPunct="1">
+              <a:defRPr sz="1800" kern="1200">
+                <a:solidFill>
+                  <a:schemeClr val="tx1"/>
+                </a:solidFill>
+                <a:latin typeface="+mn-lt"/>
+                <a:ea typeface="+mn-ea"/>
+                <a:cs typeface="+mn-cs"/>
+              </a:defRPr>
+            </a:lvl2pPr>
+            <a:lvl3pPr marL="914400" algn="l" defTabSz="914400" rtl="0" eaLnBrk="1" latinLnBrk="0" hangingPunct="1">
+              <a:defRPr sz="1800" kern="1200">
+                <a:solidFill>
+                  <a:schemeClr val="tx1"/>
+                </a:solidFill>
+                <a:latin typeface="+mn-lt"/>
+                <a:ea typeface="+mn-ea"/>
+                <a:cs typeface="+mn-cs"/>
+              </a:defRPr>
+            </a:lvl3pPr>
+            <a:lvl4pPr marL="1371600" algn="l" defTabSz="914400" rtl="0" eaLnBrk="1" latinLnBrk="0" hangingPunct="1">
+              <a:defRPr sz="1800" kern="1200">
+                <a:solidFill>
+                  <a:schemeClr val="tx1"/>
+                </a:solidFill>
+                <a:latin typeface="+mn-lt"/>
+                <a:ea typeface="+mn-ea"/>
+                <a:cs typeface="+mn-cs"/>
+              </a:defRPr>
+            </a:lvl4pPr>
+            <a:lvl5pPr marL="1828800" algn="l" defTabSz="914400" rtl="0" eaLnBrk="1" latinLnBrk="0" hangingPunct="1">
+              <a:defRPr sz="1800" kern="1200">
+                <a:solidFill>
+                  <a:schemeClr val="tx1"/>
+                </a:solidFill>
+                <a:latin typeface="+mn-lt"/>
+                <a:ea typeface="+mn-ea"/>
+                <a:cs typeface="+mn-cs"/>
+              </a:defRPr>
+            </a:lvl5pPr>
+            <a:lvl6pPr marL="2286000" algn="l" defTabSz="914400" rtl="0" eaLnBrk="1" latinLnBrk="0" hangingPunct="1">
+              <a:defRPr sz="1800" kern="1200">
+                <a:solidFill>
+                  <a:schemeClr val="tx1"/>
+                </a:solidFill>
+                <a:latin typeface="+mn-lt"/>
+                <a:ea typeface="+mn-ea"/>
+                <a:cs typeface="+mn-cs"/>
+              </a:defRPr>
+            </a:lvl6pPr>
+            <a:lvl7pPr marL="2743200" algn="l" defTabSz="914400" rtl="0" eaLnBrk="1" latinLnBrk="0" hangingPunct="1">
+              <a:defRPr sz="1800" kern="1200">
+                <a:solidFill>
+                  <a:schemeClr val="tx1"/>
+                </a:solidFill>
+                <a:latin typeface="+mn-lt"/>
+                <a:ea typeface="+mn-ea"/>
+                <a:cs typeface="+mn-cs"/>
+              </a:defRPr>
+            </a:lvl7pPr>
+            <a:lvl8pPr marL="3200400" algn="l" defTabSz="914400" rtl="0" eaLnBrk="1" latinLnBrk="0" hangingPunct="1">
+              <a:defRPr sz="1800" kern="1200">
+                <a:solidFill>
+                  <a:schemeClr val="tx1"/>
+                </a:solidFill>
+                <a:latin typeface="+mn-lt"/>
+                <a:ea typeface="+mn-ea"/>
+                <a:cs typeface="+mn-cs"/>
+              </a:defRPr>
+            </a:lvl8pPr>
+            <a:lvl9pPr marL="3657600" algn="l" defTabSz="914400" rtl="0" eaLnBrk="1" latinLnBrk="0" hangingPunct="1">
+              <a:defRPr sz="1800" kern="1200">
+                <a:solidFill>
+                  <a:schemeClr val="tx1"/>
+                </a:solidFill>
+                <a:latin typeface="+mn-lt"/>
+                <a:ea typeface="+mn-ea"/>
+                <a:cs typeface="+mn-cs"/>
+              </a:defRPr>
+            </a:lvl9pPr>
+          </a:lstStyle>
+          <a:p>
+            <a:pPr>
+              <a:spcAft>
+                <a:spcPts val="600"/>
+              </a:spcAft>
+            </a:pPr>
+            <a:fld id="{A52BEA90-E6BE-45F4-8D5D-C2E01FE3DBCB}" type="slidenum">
+              <a:rPr lang="en-US" smtClean="0">
+                <a:solidFill>
+                  <a:schemeClr val="tx1">
+                    <a:alpha val="80000"/>
+                  </a:schemeClr>
+                </a:solidFill>
+              </a:rPr>
+              <a:pPr>
+                <a:spcAft>
+                  <a:spcPts val="600"/>
+                </a:spcAft>
+              </a:pPr>
+              <a:t>3</a:t>
+            </a:fld>
+            <a:endParaRPr lang="en-US" dirty="0">
+              <a:solidFill>
+                <a:schemeClr val="tx1">
+                  <a:alpha val="80000"/>
+                </a:schemeClr>
+              </a:solidFill>
+            </a:endParaRPr>
+          </a:p>
+        </p:txBody>
+      </p:sp>
     </p:spTree>
     <p:extLst>
       <p:ext uri="{BB962C8B-B14F-4D97-AF65-F5344CB8AC3E}">
@@ -12310,7 +13634,159 @@
               <a:rPr lang="en-US" sz="1200" dirty="0"/>
               <a:t>G. Resto, K. Domenech, C. Roque Adversary Emulation Framework</a:t>
             </a:r>
-            <a:endParaRPr lang="en-US" sz="1200"/>
+          </a:p>
+        </p:txBody>
+      </p:sp>
+      <p:sp>
+        <p:nvSpPr>
+          <p:cNvPr id="4" name="Slide Number Placeholder 2">
+            <a:extLst>
+              <a:ext uri="{FF2B5EF4-FFF2-40B4-BE49-F238E27FC236}">
+                <a16:creationId xmlns:a16="http://schemas.microsoft.com/office/drawing/2014/main" id="{60D01F48-1A81-D3E9-5ACB-F671F9F001A0}"/>
+              </a:ext>
+            </a:extLst>
+          </p:cNvPr>
+          <p:cNvSpPr txBox="1">
+            <a:spLocks/>
+          </p:cNvSpPr>
+          <p:nvPr/>
+        </p:nvSpPr>
+        <p:spPr>
+          <a:xfrm>
+            <a:off x="11034184" y="6356350"/>
+            <a:ext cx="514349" cy="365125"/>
+          </a:xfrm>
+          <a:prstGeom prst="rect">
+            <a:avLst/>
+          </a:prstGeom>
+        </p:spPr>
+        <p:txBody>
+          <a:bodyPr>
+            <a:normAutofit lnSpcReduction="10000"/>
+          </a:bodyPr>
+          <a:lstStyle>
+            <a:defPPr>
+              <a:defRPr lang="en-US"/>
+            </a:defPPr>
+            <a:lvl1pPr marL="0" algn="l" defTabSz="914400" rtl="0" eaLnBrk="1" latinLnBrk="0" hangingPunct="1">
+              <a:defRPr sz="1800" kern="1200">
+                <a:solidFill>
+                  <a:schemeClr val="tx1"/>
+                </a:solidFill>
+                <a:latin typeface="+mn-lt"/>
+                <a:ea typeface="+mn-ea"/>
+                <a:cs typeface="+mn-cs"/>
+              </a:defRPr>
+            </a:lvl1pPr>
+            <a:lvl2pPr marL="457200" algn="l" defTabSz="914400" rtl="0" eaLnBrk="1" latinLnBrk="0" hangingPunct="1">
+              <a:defRPr sz="1800" kern="1200">
+                <a:solidFill>
+                  <a:schemeClr val="tx1"/>
+                </a:solidFill>
+                <a:latin typeface="+mn-lt"/>
+                <a:ea typeface="+mn-ea"/>
+                <a:cs typeface="+mn-cs"/>
+              </a:defRPr>
+            </a:lvl2pPr>
+            <a:lvl3pPr marL="914400" algn="l" defTabSz="914400" rtl="0" eaLnBrk="1" latinLnBrk="0" hangingPunct="1">
+              <a:defRPr sz="1800" kern="1200">
+                <a:solidFill>
+                  <a:schemeClr val="tx1"/>
+                </a:solidFill>
+                <a:latin typeface="+mn-lt"/>
+                <a:ea typeface="+mn-ea"/>
+                <a:cs typeface="+mn-cs"/>
+              </a:defRPr>
+            </a:lvl3pPr>
+            <a:lvl4pPr marL="1371600" algn="l" defTabSz="914400" rtl="0" eaLnBrk="1" latinLnBrk="0" hangingPunct="1">
+              <a:defRPr sz="1800" kern="1200">
+                <a:solidFill>
+                  <a:schemeClr val="tx1"/>
+                </a:solidFill>
+                <a:latin typeface="+mn-lt"/>
+                <a:ea typeface="+mn-ea"/>
+                <a:cs typeface="+mn-cs"/>
+              </a:defRPr>
+            </a:lvl4pPr>
+            <a:lvl5pPr marL="1828800" algn="l" defTabSz="914400" rtl="0" eaLnBrk="1" latinLnBrk="0" hangingPunct="1">
+              <a:defRPr sz="1800" kern="1200">
+                <a:solidFill>
+                  <a:schemeClr val="tx1"/>
+                </a:solidFill>
+                <a:latin typeface="+mn-lt"/>
+                <a:ea typeface="+mn-ea"/>
+                <a:cs typeface="+mn-cs"/>
+              </a:defRPr>
+            </a:lvl5pPr>
+            <a:lvl6pPr marL="2286000" algn="l" defTabSz="914400" rtl="0" eaLnBrk="1" latinLnBrk="0" hangingPunct="1">
+              <a:defRPr sz="1800" kern="1200">
+                <a:solidFill>
+                  <a:schemeClr val="tx1"/>
+                </a:solidFill>
+                <a:latin typeface="+mn-lt"/>
+                <a:ea typeface="+mn-ea"/>
+                <a:cs typeface="+mn-cs"/>
+              </a:defRPr>
+            </a:lvl6pPr>
+            <a:lvl7pPr marL="2743200" algn="l" defTabSz="914400" rtl="0" eaLnBrk="1" latinLnBrk="0" hangingPunct="1">
+              <a:defRPr sz="1800" kern="1200">
+                <a:solidFill>
+                  <a:schemeClr val="tx1"/>
+                </a:solidFill>
+                <a:latin typeface="+mn-lt"/>
+                <a:ea typeface="+mn-ea"/>
+                <a:cs typeface="+mn-cs"/>
+              </a:defRPr>
+            </a:lvl7pPr>
+            <a:lvl8pPr marL="3200400" algn="l" defTabSz="914400" rtl="0" eaLnBrk="1" latinLnBrk="0" hangingPunct="1">
+              <a:defRPr sz="1800" kern="1200">
+                <a:solidFill>
+                  <a:schemeClr val="tx1"/>
+                </a:solidFill>
+                <a:latin typeface="+mn-lt"/>
+                <a:ea typeface="+mn-ea"/>
+                <a:cs typeface="+mn-cs"/>
+              </a:defRPr>
+            </a:lvl8pPr>
+            <a:lvl9pPr marL="3657600" algn="l" defTabSz="914400" rtl="0" eaLnBrk="1" latinLnBrk="0" hangingPunct="1">
+              <a:defRPr sz="1800" kern="1200">
+                <a:solidFill>
+                  <a:schemeClr val="tx1"/>
+                </a:solidFill>
+                <a:latin typeface="+mn-lt"/>
+                <a:ea typeface="+mn-ea"/>
+                <a:cs typeface="+mn-cs"/>
+              </a:defRPr>
+            </a:lvl9pPr>
+          </a:lstStyle>
+          <a:p>
+            <a:pPr>
+              <a:spcAft>
+                <a:spcPts val="600"/>
+              </a:spcAft>
+            </a:pPr>
+            <a:fld id="{A52BEA90-E6BE-45F4-8D5D-C2E01FE3DBCB}" type="slidenum">
+              <a:rPr lang="en-US" smtClean="0">
+                <a:solidFill>
+                  <a:schemeClr val="tx1">
+                    <a:alpha val="80000"/>
+                  </a:schemeClr>
+                </a:solidFill>
+              </a:rPr>
+              <a:pPr>
+                <a:spcAft>
+                  <a:spcPts val="600"/>
+                </a:spcAft>
+              </a:pPr>
+              <a:t>4</a:t>
+            </a:fld>
+            <a:endParaRPr lang="en-US" dirty="0">
+              <a:solidFill>
+                <a:schemeClr val="tx1">
+                  <a:alpha val="80000"/>
+                </a:schemeClr>
+              </a:solidFill>
+            </a:endParaRPr>
           </a:p>
         </p:txBody>
       </p:sp>
@@ -12515,10 +13991,10 @@
       </p:pic>
       <p:sp>
         <p:nvSpPr>
-          <p:cNvPr id="2" name="Slide Number Placeholder 1">
+          <p:cNvPr id="5" name="Slide Number Placeholder 2">
             <a:extLst>
               <a:ext uri="{FF2B5EF4-FFF2-40B4-BE49-F238E27FC236}">
-                <a16:creationId xmlns:a16="http://schemas.microsoft.com/office/drawing/2014/main" id="{A5ED8587-8051-6FB9-F24F-9322331FE175}"/>
+                <a16:creationId xmlns:a16="http://schemas.microsoft.com/office/drawing/2014/main" id="{ADE57FA6-E3EC-B05C-4339-3E6ABDD895E3}"/>
               </a:ext>
             </a:extLst>
           </p:cNvPr>
@@ -12531,20 +14007,43 @@
         </p:nvSpPr>
         <p:spPr>
           <a:xfrm>
-            <a:off x="11024558" y="6356350"/>
-            <a:ext cx="329242" cy="365125"/>
+            <a:off x="11034184" y="6356350"/>
+            <a:ext cx="514349" cy="365125"/>
           </a:xfrm>
         </p:spPr>
         <p:txBody>
-          <a:bodyPr/>
+          <a:bodyPr>
+            <a:normAutofit/>
+          </a:bodyPr>
           <a:lstStyle/>
           <a:p>
+            <a:pPr>
+              <a:spcAft>
+                <a:spcPts val="600"/>
+              </a:spcAft>
+            </a:pPr>
             <a:fld id="{A52BEA90-E6BE-45F4-8D5D-C2E01FE3DBCB}" type="slidenum">
-              <a:rPr lang="en-US" smtClean="0"/>
-              <a:pPr/>
+              <a:rPr lang="en-US">
+                <a:solidFill>
+                  <a:schemeClr val="tx1">
+                    <a:alpha val="80000"/>
+                  </a:schemeClr>
+                </a:solidFill>
+              </a:rPr>
+              <a:pPr>
+                <a:spcAft>
+                  <a:spcPts val="600"/>
+                </a:spcAft>
+              </a:pPr>
               <a:t>5</a:t>
             </a:fld>
-            <a:endParaRPr lang="en-US" dirty="0"/>
+            <a:endParaRPr lang="en-US" dirty="0">
+              <a:solidFill>
+                <a:schemeClr val="tx1">
+                  <a:alpha val="80000"/>
+                </a:schemeClr>
+              </a:solidFill>
+            </a:endParaRPr>
           </a:p>
         </p:txBody>
       </p:sp>
@@ -12949,7 +14448,7 @@
           <a:p>
             <a:pPr algn="ctr"/>
             <a:r>
-              <a:rPr lang="en-US" sz="5400">
+              <a:rPr lang="en-US" sz="5400" dirty="0">
                 <a:solidFill>
                   <a:schemeClr val="bg1">
                     <a:lumMod val="95000"/>
@@ -12959,6 +14458,35 @@
               </a:rPr>
               <a:t>Initial Backlog</a:t>
             </a:r>
+            <a:br>
+              <a:rPr lang="en-US" sz="5400" dirty="0">
+                <a:solidFill>
+                  <a:schemeClr val="bg1">
+                    <a:lumMod val="95000"/>
+                    <a:lumOff val="5000"/>
+                  </a:schemeClr>
+                </a:solidFill>
+              </a:rPr>
+            </a:br>
+            <a:r>
+              <a:rPr lang="en-US" sz="2400" dirty="0">
+                <a:solidFill>
+                  <a:schemeClr val="bg1">
+                    <a:lumMod val="95000"/>
+                    <a:lumOff val="5000"/>
+                  </a:schemeClr>
+                </a:solidFill>
+              </a:rPr>
+              <a:t>Methodology: Scrum</a:t>
+            </a:r>
+            <a:endParaRPr lang="en-US" sz="5400" dirty="0">
+              <a:solidFill>
+                <a:schemeClr val="bg1">
+                  <a:lumMod val="95000"/>
+                  <a:lumOff val="5000"/>
+                </a:schemeClr>
+              </a:solidFill>
+            </a:endParaRPr>
           </a:p>
         </p:txBody>
       </p:sp>
@@ -13036,6 +14564,390 @@
 </file>
 
 <file path=ppt/slides/slide7.xml><?xml version="1.0" encoding="utf-8"?>
+<p:sld xmlns:a="http://schemas.openxmlformats.org/drawingml/2006/main" xmlns:r="http://schemas.openxmlformats.org/officeDocument/2006/relationships" xmlns:p="http://schemas.openxmlformats.org/presentationml/2006/main">
+  <p:cSld>
+    <p:bg>
+      <p:bgPr>
+        <a:solidFill>
+          <a:schemeClr val="bg1">
+            <a:tint val="95000"/>
+            <a:satMod val="170000"/>
+          </a:schemeClr>
+        </a:solidFill>
+        <a:effectLst/>
+      </p:bgPr>
+    </p:bg>
+    <p:spTree>
+      <p:nvGrpSpPr>
+        <p:cNvPr id="1" name=""/>
+        <p:cNvGrpSpPr/>
+        <p:nvPr/>
+      </p:nvGrpSpPr>
+      <p:grpSpPr>
+        <a:xfrm>
+          <a:off x="0" y="0"/>
+          <a:ext cx="0" cy="0"/>
+          <a:chOff x="0" y="0"/>
+          <a:chExt cx="0" cy="0"/>
+        </a:xfrm>
+      </p:grpSpPr>
+      <p:grpSp>
+        <p:nvGrpSpPr>
+          <p:cNvPr id="9" name="Group 8">
+            <a:extLst>
+              <a:ext uri="{FF2B5EF4-FFF2-40B4-BE49-F238E27FC236}">
+                <a16:creationId xmlns:a16="http://schemas.microsoft.com/office/drawing/2014/main" id="{D2C4BFA1-2075-4901-9E24-E41D1FDD51FD}"/>
+              </a:ext>
+              <a:ext uri="{C183D7F6-B498-43B3-948B-1728B52AA6E4}">
+                <adec:decorative xmlns:adec="http://schemas.microsoft.com/office/drawing/2017/decorative" val="1"/>
+              </a:ext>
+            </a:extLst>
+          </p:cNvPr>
+          <p:cNvGrpSpPr>
+            <a:grpSpLocks noGrp="1" noUngrp="1" noRot="1" noChangeAspect="1" noMove="1" noResize="1"/>
+          </p:cNvGrpSpPr>
+          <p:nvPr>
+            <p:extLst>
+              <p:ext uri="{386F3935-93C4-4BCD-93E2-E3B085C9AB24}">
+                <p16:designElem xmlns:p16="http://schemas.microsoft.com/office/powerpoint/2015/main" val="1"/>
+              </p:ext>
+            </p:extLst>
+          </p:nvPr>
+        </p:nvGrpSpPr>
+        <p:grpSpPr>
+          <a:xfrm>
+            <a:off x="1155481" y="498348"/>
+            <a:ext cx="9902663" cy="5861304"/>
+            <a:chOff x="1155481" y="498348"/>
+            <a:chExt cx="9902663" cy="5861304"/>
+          </a:xfrm>
+        </p:grpSpPr>
+        <p:sp>
+          <p:nvSpPr>
+            <p:cNvPr id="10" name="Oval 5">
+              <a:extLst>
+                <a:ext uri="{FF2B5EF4-FFF2-40B4-BE49-F238E27FC236}">
+                  <a16:creationId xmlns:a16="http://schemas.microsoft.com/office/drawing/2014/main" id="{985A7375-E3AF-4F5C-85AE-17E8832952CA}"/>
+                </a:ext>
+                <a:ext uri="{C183D7F6-B498-43B3-948B-1728B52AA6E4}">
+                  <adec:decorative xmlns:adec="http://schemas.microsoft.com/office/drawing/2017/decorative" val="1"/>
+                </a:ext>
+              </a:extLst>
+            </p:cNvPr>
+            <p:cNvSpPr>
+              <a:spLocks noChangeArrowheads="1"/>
+            </p:cNvSpPr>
+            <p:nvPr>
+              <p:extLst>
+                <p:ext uri="{386F3935-93C4-4BCD-93E2-E3B085C9AB24}">
+                  <p16:designElem xmlns:p16="http://schemas.microsoft.com/office/powerpoint/2015/main" val="1"/>
+                </p:ext>
+              </p:extLst>
+            </p:nvPr>
+          </p:nvSpPr>
+          <p:spPr bwMode="auto">
+            <a:xfrm>
+              <a:off x="1155481" y="498348"/>
+              <a:ext cx="5861304" cy="5861304"/>
+            </a:xfrm>
+            <a:prstGeom prst="ellipse">
+              <a:avLst/>
+            </a:prstGeom>
+            <a:solidFill>
+              <a:schemeClr val="accent1">
+                <a:alpha val="55000"/>
+              </a:schemeClr>
+            </a:solidFill>
+            <a:ln>
+              <a:noFill/>
+            </a:ln>
+          </p:spPr>
+          <p:txBody>
+            <a:bodyPr/>
+            <a:lstStyle/>
+            <a:p>
+              <a:endParaRPr lang="en-US"/>
+            </a:p>
+          </p:txBody>
+        </p:sp>
+        <p:sp>
+          <p:nvSpPr>
+            <p:cNvPr id="11" name="Oval 10">
+              <a:extLst>
+                <a:ext uri="{FF2B5EF4-FFF2-40B4-BE49-F238E27FC236}">
+                  <a16:creationId xmlns:a16="http://schemas.microsoft.com/office/drawing/2014/main" id="{F0307F65-8304-4FA8-A841-D4D7625411BE}"/>
+                </a:ext>
+                <a:ext uri="{C183D7F6-B498-43B3-948B-1728B52AA6E4}">
+                  <adec:decorative xmlns:adec="http://schemas.microsoft.com/office/drawing/2017/decorative" val="1"/>
+                </a:ext>
+              </a:extLst>
+            </p:cNvPr>
+            <p:cNvSpPr>
+              <a:spLocks noChangeArrowheads="1"/>
+            </p:cNvSpPr>
+            <p:nvPr>
+              <p:extLst>
+                <p:ext uri="{386F3935-93C4-4BCD-93E2-E3B085C9AB24}">
+                  <p16:designElem xmlns:p16="http://schemas.microsoft.com/office/powerpoint/2015/main" val="1"/>
+                </p:ext>
+              </p:extLst>
+            </p:nvPr>
+          </p:nvSpPr>
+          <p:spPr bwMode="auto">
+            <a:xfrm>
+              <a:off x="5196840" y="498348"/>
+              <a:ext cx="5861304" cy="5861304"/>
+            </a:xfrm>
+            <a:prstGeom prst="ellipse">
+              <a:avLst/>
+            </a:prstGeom>
+            <a:solidFill>
+              <a:schemeClr val="accent1">
+                <a:alpha val="55000"/>
+              </a:schemeClr>
+            </a:solidFill>
+            <a:ln>
+              <a:noFill/>
+            </a:ln>
+          </p:spPr>
+          <p:txBody>
+            <a:bodyPr/>
+            <a:lstStyle/>
+            <a:p>
+              <a:endParaRPr lang="en-US"/>
+            </a:p>
+          </p:txBody>
+        </p:sp>
+        <p:sp>
+          <p:nvSpPr>
+            <p:cNvPr id="12" name="Oval 5">
+              <a:extLst>
+                <a:ext uri="{FF2B5EF4-FFF2-40B4-BE49-F238E27FC236}">
+                  <a16:creationId xmlns:a16="http://schemas.microsoft.com/office/drawing/2014/main" id="{C8B8394C-136F-4E05-A002-D93A5E79CD50}"/>
+                </a:ext>
+                <a:ext uri="{C183D7F6-B498-43B3-948B-1728B52AA6E4}">
+                  <adec:decorative xmlns:adec="http://schemas.microsoft.com/office/drawing/2017/decorative" val="1"/>
+                </a:ext>
+              </a:extLst>
+            </p:cNvPr>
+            <p:cNvSpPr>
+              <a:spLocks noChangeArrowheads="1"/>
+            </p:cNvSpPr>
+            <p:nvPr>
+              <p:extLst>
+                <p:ext uri="{386F3935-93C4-4BCD-93E2-E3B085C9AB24}">
+                  <p16:designElem xmlns:p16="http://schemas.microsoft.com/office/powerpoint/2015/main" val="1"/>
+                </p:ext>
+              </p:extLst>
+            </p:nvPr>
+          </p:nvSpPr>
+          <p:spPr bwMode="auto">
+            <a:xfrm>
+              <a:off x="3165348" y="498348"/>
+              <a:ext cx="5861304" cy="5861304"/>
+            </a:xfrm>
+            <a:prstGeom prst="ellipse">
+              <a:avLst/>
+            </a:prstGeom>
+            <a:solidFill>
+              <a:schemeClr val="accent1">
+                <a:alpha val="70000"/>
+              </a:schemeClr>
+            </a:solidFill>
+            <a:ln>
+              <a:noFill/>
+            </a:ln>
+          </p:spPr>
+          <p:txBody>
+            <a:bodyPr/>
+            <a:lstStyle/>
+            <a:p>
+              <a:endParaRPr lang="en-US"/>
+            </a:p>
+          </p:txBody>
+        </p:sp>
+      </p:grpSp>
+      <p:sp>
+        <p:nvSpPr>
+          <p:cNvPr id="14" name="Rectangle 13">
+            <a:extLst>
+              <a:ext uri="{FF2B5EF4-FFF2-40B4-BE49-F238E27FC236}">
+                <a16:creationId xmlns:a16="http://schemas.microsoft.com/office/drawing/2014/main" id="{053FB2EE-284F-4C87-AB3D-BBF87A9FAB97}"/>
+              </a:ext>
+              <a:ext uri="{C183D7F6-B498-43B3-948B-1728B52AA6E4}">
+                <adec:decorative xmlns:adec="http://schemas.microsoft.com/office/drawing/2017/decorative" val="1"/>
+              </a:ext>
+            </a:extLst>
+          </p:cNvPr>
+          <p:cNvSpPr>
+            <a:spLocks noGrp="1" noRot="1" noChangeAspect="1" noMove="1" noResize="1" noEditPoints="1" noAdjustHandles="1" noChangeArrowheads="1" noChangeShapeType="1" noTextEdit="1"/>
+          </p:cNvSpPr>
+          <p:nvPr>
+            <p:extLst>
+              <p:ext uri="{386F3935-93C4-4BCD-93E2-E3B085C9AB24}">
+                <p16:designElem xmlns:p16="http://schemas.microsoft.com/office/powerpoint/2015/main" val="1"/>
+              </p:ext>
+            </p:extLst>
+          </p:nvPr>
+        </p:nvSpPr>
+        <p:spPr>
+          <a:xfrm>
+            <a:off x="0" y="2514600"/>
+            <a:ext cx="12192000" cy="1828800"/>
+          </a:xfrm>
+          <a:prstGeom prst="rect">
+            <a:avLst/>
+          </a:prstGeom>
+          <a:solidFill>
+            <a:schemeClr val="tx2"/>
+          </a:solidFill>
+          <a:ln>
+            <a:noFill/>
+          </a:ln>
+        </p:spPr>
+        <p:style>
+          <a:lnRef idx="2">
+            <a:schemeClr val="accent1">
+              <a:shade val="50000"/>
+            </a:schemeClr>
+          </a:lnRef>
+          <a:fillRef idx="1">
+            <a:schemeClr val="accent1"/>
+          </a:fillRef>
+          <a:effectRef idx="0">
+            <a:schemeClr val="accent1"/>
+          </a:effectRef>
+          <a:fontRef idx="minor">
+            <a:schemeClr val="lt1"/>
+          </a:fontRef>
+        </p:style>
+        <p:txBody>
+          <a:bodyPr/>
+          <a:lstStyle/>
+          <a:p>
+            <a:endParaRPr lang="en-US"/>
+          </a:p>
+        </p:txBody>
+      </p:sp>
+      <p:sp>
+        <p:nvSpPr>
+          <p:cNvPr id="4" name="Title 3">
+            <a:extLst>
+              <a:ext uri="{FF2B5EF4-FFF2-40B4-BE49-F238E27FC236}">
+                <a16:creationId xmlns:a16="http://schemas.microsoft.com/office/drawing/2014/main" id="{9EF3B5DB-0924-5F0D-DD9B-8E7456EE4B04}"/>
+              </a:ext>
+            </a:extLst>
+          </p:cNvPr>
+          <p:cNvSpPr>
+            <a:spLocks noGrp="1"/>
+          </p:cNvSpPr>
+          <p:nvPr>
+            <p:ph type="title"/>
+          </p:nvPr>
+        </p:nvSpPr>
+        <p:spPr>
+          <a:xfrm>
+            <a:off x="1524000" y="2776538"/>
+            <a:ext cx="9144000" cy="1381188"/>
+          </a:xfrm>
+        </p:spPr>
+        <p:txBody>
+          <a:bodyPr vert="horz" lIns="91440" tIns="45720" rIns="91440" bIns="45720" rtlCol="0" anchor="ctr">
+            <a:normAutofit/>
+          </a:bodyPr>
+          <a:lstStyle/>
+          <a:p>
+            <a:pPr algn="ctr"/>
+            <a:r>
+              <a:rPr lang="en-US" sz="4000" dirty="0">
+                <a:solidFill>
+                  <a:schemeClr val="bg1">
+                    <a:lumMod val="95000"/>
+                    <a:lumOff val="5000"/>
+                  </a:schemeClr>
+                </a:solidFill>
+              </a:rPr>
+              <a:t>Project Improvements</a:t>
+            </a:r>
+            <a:endParaRPr lang="en-US" sz="4000" kern="1200" dirty="0">
+              <a:solidFill>
+                <a:schemeClr val="bg2"/>
+              </a:solidFill>
+              <a:latin typeface="+mj-lt"/>
+              <a:ea typeface="+mj-ea"/>
+              <a:cs typeface="+mj-cs"/>
+            </a:endParaRPr>
+          </a:p>
+        </p:txBody>
+      </p:sp>
+      <p:sp>
+        <p:nvSpPr>
+          <p:cNvPr id="3" name="Slide Number Placeholder 2">
+            <a:extLst>
+              <a:ext uri="{FF2B5EF4-FFF2-40B4-BE49-F238E27FC236}">
+                <a16:creationId xmlns:a16="http://schemas.microsoft.com/office/drawing/2014/main" id="{5C335D6A-C5E7-220B-A4AC-B36891A5F5C3}"/>
+              </a:ext>
+            </a:extLst>
+          </p:cNvPr>
+          <p:cNvSpPr>
+            <a:spLocks noGrp="1"/>
+          </p:cNvSpPr>
+          <p:nvPr>
+            <p:ph type="sldNum" sz="quarter" idx="12"/>
+          </p:nvPr>
+        </p:nvSpPr>
+        <p:spPr>
+          <a:xfrm>
+            <a:off x="8610600" y="6356350"/>
+            <a:ext cx="2743200" cy="365125"/>
+          </a:xfrm>
+        </p:spPr>
+        <p:txBody>
+          <a:bodyPr vert="horz" lIns="91440" tIns="45720" rIns="91440" bIns="45720" rtlCol="0" anchor="ctr">
+            <a:normAutofit/>
+          </a:bodyPr>
+          <a:lstStyle/>
+          <a:p>
+            <a:pPr>
+              <a:spcAft>
+                <a:spcPts val="600"/>
+              </a:spcAft>
+            </a:pPr>
+            <a:fld id="{A52BEA90-E6BE-45F4-8D5D-C2E01FE3DBCB}" type="slidenum">
+              <a:rPr lang="en-US">
+                <a:solidFill>
+                  <a:schemeClr val="tx1"/>
+                </a:solidFill>
+              </a:rPr>
+              <a:pPr>
+                <a:spcAft>
+                  <a:spcPts val="600"/>
+                </a:spcAft>
+              </a:pPr>
+              <a:t>7</a:t>
+            </a:fld>
+            <a:endParaRPr lang="en-US">
+              <a:solidFill>
+                <a:schemeClr val="tx1"/>
+              </a:solidFill>
+            </a:endParaRPr>
+          </a:p>
+        </p:txBody>
+      </p:sp>
+    </p:spTree>
+    <p:extLst>
+      <p:ext uri="{BB962C8B-B14F-4D97-AF65-F5344CB8AC3E}">
+        <p14:creationId xmlns:p14="http://schemas.microsoft.com/office/powerpoint/2010/main" val="851387547"/>
+      </p:ext>
+    </p:extLst>
+  </p:cSld>
+  <p:clrMapOvr>
+    <a:overrideClrMapping bg1="dk1" tx1="lt1" bg2="dk2" tx2="lt2" accent1="accent1" accent2="accent2" accent3="accent3" accent4="accent4" accent5="accent5" accent6="accent6" hlink="hlink" folHlink="folHlink"/>
+  </p:clrMapOvr>
+</p:sld>
+</file>
+
+<file path=ppt/slides/slide8.xml><?xml version="1.0" encoding="utf-8"?>
 <p:sld xmlns:a="http://schemas.openxmlformats.org/drawingml/2006/main" xmlns:r="http://schemas.openxmlformats.org/officeDocument/2006/relationships" xmlns:p="http://schemas.openxmlformats.org/presentationml/2006/main">
   <p:cSld>
     <p:bg>
@@ -13901,7 +15813,7 @@
         </p:nvSpPr>
         <p:spPr>
           <a:xfrm>
-            <a:off x="9567765" y="5838460"/>
+            <a:off x="10132406" y="6535302"/>
             <a:ext cx="1889129" cy="251447"/>
           </a:xfrm>
         </p:spPr>
@@ -13930,9 +15842,9 @@
                   <a:spcPts val="600"/>
                 </a:spcAft>
               </a:pPr>
-              <a:t>7</a:t>
+              <a:t>8</a:t>
             </a:fld>
-            <a:endParaRPr lang="en-US" sz="2800"/>
+            <a:endParaRPr lang="en-US" sz="2800" dirty="0"/>
           </a:p>
         </p:txBody>
       </p:sp>
@@ -14215,7 +16127,7 @@
 </p:sld>
 </file>
 
-<file path=ppt/slides/slide8.xml><?xml version="1.0" encoding="utf-8"?>
+<file path=ppt/slides/slide9.xml><?xml version="1.0" encoding="utf-8"?>
 <p:sld xmlns:a="http://schemas.openxmlformats.org/drawingml/2006/main" xmlns:r="http://schemas.openxmlformats.org/officeDocument/2006/relationships" xmlns:p="http://schemas.openxmlformats.org/presentationml/2006/main">
   <p:cSld>
     <p:bg>
@@ -14614,7 +16526,7 @@
         </p:nvSpPr>
         <p:spPr>
           <a:xfrm>
-            <a:off x="8610600" y="6356350"/>
+            <a:off x="9108698" y="6360469"/>
             <a:ext cx="2743200" cy="365125"/>
           </a:xfrm>
         </p:spPr>
@@ -14643,9 +16555,9 @@
                   <a:spcPts val="600"/>
                 </a:spcAft>
               </a:pPr>
-              <a:t>8</a:t>
+              <a:t>9</a:t>
             </a:fld>
-            <a:endParaRPr lang="en-US">
+            <a:endParaRPr lang="en-US" dirty="0">
               <a:solidFill>
                 <a:schemeClr val="tx1">
                   <a:lumMod val="50000"/>
@@ -14656,415 +16568,31 @@
           </a:p>
         </p:txBody>
       </p:sp>
-    </p:spTree>
-    <p:extLst>
-      <p:ext uri="{BB962C8B-B14F-4D97-AF65-F5344CB8AC3E}">
-        <p14:creationId xmlns:p14="http://schemas.microsoft.com/office/powerpoint/2010/main" val="14020583"/>
-      </p:ext>
-    </p:extLst>
-  </p:cSld>
-  <p:clrMapOvr>
-    <a:masterClrMapping/>
-  </p:clrMapOvr>
-</p:sld>
-</file>
-
-<file path=ppt/slides/slide9.xml><?xml version="1.0" encoding="utf-8"?>
-<p:sld xmlns:a="http://schemas.openxmlformats.org/drawingml/2006/main" xmlns:r="http://schemas.openxmlformats.org/officeDocument/2006/relationships" xmlns:p="http://schemas.openxmlformats.org/presentationml/2006/main">
-  <p:cSld>
-    <p:bg>
-      <p:bgPr>
-        <a:solidFill>
-          <a:schemeClr val="bg1"/>
-        </a:solidFill>
-        <a:effectLst/>
-      </p:bgPr>
-    </p:bg>
-    <p:spTree>
-      <p:nvGrpSpPr>
-        <p:cNvPr id="1" name=""/>
-        <p:cNvGrpSpPr/>
-        <p:nvPr/>
-      </p:nvGrpSpPr>
-      <p:grpSpPr>
-        <a:xfrm>
-          <a:off x="0" y="0"/>
-          <a:ext cx="0" cy="0"/>
-          <a:chOff x="0" y="0"/>
-          <a:chExt cx="0" cy="0"/>
-        </a:xfrm>
-      </p:grpSpPr>
-      <p:sp useBgFill="1">
+      <p:sp>
         <p:nvSpPr>
-          <p:cNvPr id="10" name="Slide Background">
+          <p:cNvPr id="5" name="TextBox 4">
             <a:extLst>
               <a:ext uri="{FF2B5EF4-FFF2-40B4-BE49-F238E27FC236}">
-                <a16:creationId xmlns:a16="http://schemas.microsoft.com/office/drawing/2014/main" id="{C0763A76-9F1C-4FC5-82B7-DD475DA461B2}"/>
-              </a:ext>
-              <a:ext uri="{C183D7F6-B498-43B3-948B-1728B52AA6E4}">
-                <adec:decorative xmlns:adec="http://schemas.microsoft.com/office/drawing/2017/decorative" val="1"/>
+                <a16:creationId xmlns:a16="http://schemas.microsoft.com/office/drawing/2014/main" id="{4A58C428-4FAB-41CF-BA22-FEAC4CA791D1}"/>
               </a:ext>
             </a:extLst>
           </p:cNvPr>
-          <p:cNvSpPr>
-            <a:spLocks noGrp="1" noRot="1" noChangeAspect="1" noMove="1" noResize="1" noEditPoints="1" noAdjustHandles="1" noChangeArrowheads="1" noChangeShapeType="1" noTextEdit="1"/>
-          </p:cNvSpPr>
-          <p:nvPr>
-            <p:extLst>
-              <p:ext uri="{386F3935-93C4-4BCD-93E2-E3B085C9AB24}">
-                <p16:designElem xmlns:p16="http://schemas.microsoft.com/office/powerpoint/2015/main" val="1"/>
-              </p:ext>
-            </p:extLst>
-          </p:nvPr>
+          <p:cNvSpPr txBox="1"/>
+          <p:nvPr/>
         </p:nvSpPr>
-        <p:spPr bwMode="white">
+        <p:spPr>
           <a:xfrm>
-            <a:off x="-1" y="0"/>
-            <a:ext cx="12191999" cy="6858000"/>
+            <a:off x="231010" y="6543032"/>
+            <a:ext cx="7420424" cy="276999"/>
           </a:xfrm>
           <a:prstGeom prst="rect">
             <a:avLst/>
           </a:prstGeom>
-          <a:ln>
-            <a:noFill/>
-          </a:ln>
-        </p:spPr>
-        <p:style>
-          <a:lnRef idx="2">
-            <a:schemeClr val="accent1">
-              <a:shade val="50000"/>
-            </a:schemeClr>
-          </a:lnRef>
-          <a:fillRef idx="1">
-            <a:schemeClr val="accent1"/>
-          </a:fillRef>
-          <a:effectRef idx="0">
-            <a:schemeClr val="accent1"/>
-          </a:effectRef>
-          <a:fontRef idx="minor">
-            <a:schemeClr val="lt1"/>
-          </a:fontRef>
-        </p:style>
-        <p:txBody>
-          <a:bodyPr rtlCol="0" anchor="ctr"/>
-          <a:lstStyle>
-            <a:defPPr>
-              <a:defRPr lang="en-US"/>
-            </a:defPPr>
-            <a:lvl1pPr marL="0" algn="l" defTabSz="914400" rtl="0" eaLnBrk="1" latinLnBrk="0" hangingPunct="1">
-              <a:defRPr sz="1800" kern="1200">
-                <a:solidFill>
-                  <a:schemeClr val="lt1"/>
-                </a:solidFill>
-                <a:latin typeface="+mn-lt"/>
-                <a:ea typeface="+mn-ea"/>
-                <a:cs typeface="+mn-cs"/>
-              </a:defRPr>
-            </a:lvl1pPr>
-            <a:lvl2pPr marL="457200" algn="l" defTabSz="914400" rtl="0" eaLnBrk="1" latinLnBrk="0" hangingPunct="1">
-              <a:defRPr sz="1800" kern="1200">
-                <a:solidFill>
-                  <a:schemeClr val="lt1"/>
-                </a:solidFill>
-                <a:latin typeface="+mn-lt"/>
-                <a:ea typeface="+mn-ea"/>
-                <a:cs typeface="+mn-cs"/>
-              </a:defRPr>
-            </a:lvl2pPr>
-            <a:lvl3pPr marL="914400" algn="l" defTabSz="914400" rtl="0" eaLnBrk="1" latinLnBrk="0" hangingPunct="1">
-              <a:defRPr sz="1800" kern="1200">
-                <a:solidFill>
-                  <a:schemeClr val="lt1"/>
-                </a:solidFill>
-                <a:latin typeface="+mn-lt"/>
-                <a:ea typeface="+mn-ea"/>
-                <a:cs typeface="+mn-cs"/>
-              </a:defRPr>
-            </a:lvl3pPr>
-            <a:lvl4pPr marL="1371600" algn="l" defTabSz="914400" rtl="0" eaLnBrk="1" latinLnBrk="0" hangingPunct="1">
-              <a:defRPr sz="1800" kern="1200">
-                <a:solidFill>
-                  <a:schemeClr val="lt1"/>
-                </a:solidFill>
-                <a:latin typeface="+mn-lt"/>
-                <a:ea typeface="+mn-ea"/>
-                <a:cs typeface="+mn-cs"/>
-              </a:defRPr>
-            </a:lvl4pPr>
-            <a:lvl5pPr marL="1828800" algn="l" defTabSz="914400" rtl="0" eaLnBrk="1" latinLnBrk="0" hangingPunct="1">
-              <a:defRPr sz="1800" kern="1200">
-                <a:solidFill>
-                  <a:schemeClr val="lt1"/>
-                </a:solidFill>
-                <a:latin typeface="+mn-lt"/>
-                <a:ea typeface="+mn-ea"/>
-                <a:cs typeface="+mn-cs"/>
-              </a:defRPr>
-            </a:lvl5pPr>
-            <a:lvl6pPr marL="2286000" algn="l" defTabSz="914400" rtl="0" eaLnBrk="1" latinLnBrk="0" hangingPunct="1">
-              <a:defRPr sz="1800" kern="1200">
-                <a:solidFill>
-                  <a:schemeClr val="lt1"/>
-                </a:solidFill>
-                <a:latin typeface="+mn-lt"/>
-                <a:ea typeface="+mn-ea"/>
-                <a:cs typeface="+mn-cs"/>
-              </a:defRPr>
-            </a:lvl6pPr>
-            <a:lvl7pPr marL="2743200" algn="l" defTabSz="914400" rtl="0" eaLnBrk="1" latinLnBrk="0" hangingPunct="1">
-              <a:defRPr sz="1800" kern="1200">
-                <a:solidFill>
-                  <a:schemeClr val="lt1"/>
-                </a:solidFill>
-                <a:latin typeface="+mn-lt"/>
-                <a:ea typeface="+mn-ea"/>
-                <a:cs typeface="+mn-cs"/>
-              </a:defRPr>
-            </a:lvl7pPr>
-            <a:lvl8pPr marL="3200400" algn="l" defTabSz="914400" rtl="0" eaLnBrk="1" latinLnBrk="0" hangingPunct="1">
-              <a:defRPr sz="1800" kern="1200">
-                <a:solidFill>
-                  <a:schemeClr val="lt1"/>
-                </a:solidFill>
-                <a:latin typeface="+mn-lt"/>
-                <a:ea typeface="+mn-ea"/>
-                <a:cs typeface="+mn-cs"/>
-              </a:defRPr>
-            </a:lvl8pPr>
-            <a:lvl9pPr marL="3657600" algn="l" defTabSz="914400" rtl="0" eaLnBrk="1" latinLnBrk="0" hangingPunct="1">
-              <a:defRPr sz="1800" kern="1200">
-                <a:solidFill>
-                  <a:schemeClr val="lt1"/>
-                </a:solidFill>
-                <a:latin typeface="+mn-lt"/>
-                <a:ea typeface="+mn-ea"/>
-                <a:cs typeface="+mn-cs"/>
-              </a:defRPr>
-            </a:lvl9pPr>
-          </a:lstStyle>
-          <a:p>
-            <a:pPr algn="ctr"/>
-            <a:endParaRPr lang="en-US"/>
-          </a:p>
-        </p:txBody>
-      </p:sp>
-      <p:sp useBgFill="1">
-        <p:nvSpPr>
-          <p:cNvPr id="12" name="Rectangle 11">
-            <a:extLst>
-              <a:ext uri="{FF2B5EF4-FFF2-40B4-BE49-F238E27FC236}">
-                <a16:creationId xmlns:a16="http://schemas.microsoft.com/office/drawing/2014/main" id="{E81BF4F6-F2CF-4984-9D14-D6966D92F99F}"/>
-              </a:ext>
-              <a:ext uri="{C183D7F6-B498-43B3-948B-1728B52AA6E4}">
-                <adec:decorative xmlns:adec="http://schemas.microsoft.com/office/drawing/2017/decorative" val="1"/>
-              </a:ext>
-            </a:extLst>
-          </p:cNvPr>
-          <p:cNvSpPr>
-            <a:spLocks noGrp="1" noRot="1" noChangeAspect="1" noMove="1" noResize="1" noEditPoints="1" noAdjustHandles="1" noChangeArrowheads="1" noChangeShapeType="1" noTextEdit="1"/>
-          </p:cNvSpPr>
-          <p:nvPr>
-            <p:extLst>
-              <p:ext uri="{386F3935-93C4-4BCD-93E2-E3B085C9AB24}">
-                <p16:designElem xmlns:p16="http://schemas.microsoft.com/office/powerpoint/2015/main" val="1"/>
-              </p:ext>
-            </p:extLst>
-          </p:nvPr>
-        </p:nvSpPr>
-        <p:spPr>
-          <a:xfrm>
-            <a:off x="1" y="0"/>
-            <a:ext cx="8522446" cy="2285999"/>
-          </a:xfrm>
-          <a:prstGeom prst="rect">
-            <a:avLst/>
-          </a:prstGeom>
-          <a:ln>
-            <a:noFill/>
-          </a:ln>
-          <a:effectLst>
-            <a:outerShdw blurRad="596900" dist="304800" dir="7140000" sx="90000" sy="90000" algn="t" rotWithShape="0">
-              <a:srgbClr val="000000">
-                <a:alpha val="15000"/>
-              </a:srgbClr>
-            </a:outerShdw>
-          </a:effectLst>
-        </p:spPr>
-        <p:style>
-          <a:lnRef idx="2">
-            <a:schemeClr val="accent1">
-              <a:shade val="50000"/>
-            </a:schemeClr>
-          </a:lnRef>
-          <a:fillRef idx="1">
-            <a:schemeClr val="accent1"/>
-          </a:fillRef>
-          <a:effectRef idx="0">
-            <a:schemeClr val="accent1"/>
-          </a:effectRef>
-          <a:fontRef idx="minor">
-            <a:schemeClr val="lt1"/>
-          </a:fontRef>
-        </p:style>
-        <p:txBody>
-          <a:bodyPr rtlCol="0" anchor="ctr"/>
-          <a:lstStyle/>
-          <a:p>
-            <a:pPr algn="ctr"/>
-            <a:endParaRPr lang="en-US"/>
-          </a:p>
-        </p:txBody>
-      </p:sp>
-      <p:sp>
-        <p:nvSpPr>
-          <p:cNvPr id="2" name="Title 1">
-            <a:extLst>
-              <a:ext uri="{FF2B5EF4-FFF2-40B4-BE49-F238E27FC236}">
-                <a16:creationId xmlns:a16="http://schemas.microsoft.com/office/drawing/2014/main" id="{829E97F6-7A08-129C-E46E-996FD245C5DE}"/>
-              </a:ext>
-            </a:extLst>
-          </p:cNvPr>
-          <p:cNvSpPr>
-            <a:spLocks noGrp="1"/>
-          </p:cNvSpPr>
-          <p:nvPr>
-            <p:ph type="title"/>
-          </p:nvPr>
-        </p:nvSpPr>
-        <p:spPr>
-          <a:xfrm>
-            <a:off x="761803" y="350196"/>
-            <a:ext cx="4646904" cy="1624520"/>
-          </a:xfrm>
+          <a:noFill/>
         </p:spPr>
         <p:txBody>
-          <a:bodyPr anchor="ctr">
-            <a:normAutofit/>
-          </a:bodyPr>
-          <a:lstStyle/>
-          <a:p>
-            <a:r>
-              <a:rPr lang="en-US" sz="4000"/>
-              <a:t>Interface</a:t>
-            </a:r>
-          </a:p>
-        </p:txBody>
-      </p:sp>
-      <p:sp>
-        <p:nvSpPr>
-          <p:cNvPr id="3" name="Content Placeholder 2">
-            <a:extLst>
-              <a:ext uri="{FF2B5EF4-FFF2-40B4-BE49-F238E27FC236}">
-                <a16:creationId xmlns:a16="http://schemas.microsoft.com/office/drawing/2014/main" id="{6B4A1A3B-D801-C4FB-19BF-01040CA15176}"/>
-              </a:ext>
-            </a:extLst>
-          </p:cNvPr>
-          <p:cNvSpPr>
-            <a:spLocks noGrp="1"/>
-          </p:cNvSpPr>
-          <p:nvPr>
-            <p:ph idx="1"/>
-          </p:nvPr>
-        </p:nvSpPr>
-        <p:spPr>
-          <a:xfrm>
-            <a:off x="761802" y="2743200"/>
-            <a:ext cx="4646905" cy="3613149"/>
-          </a:xfrm>
-        </p:spPr>
-        <p:txBody>
-          <a:bodyPr anchor="ctr">
-            <a:normAutofit/>
-          </a:bodyPr>
-          <a:lstStyle/>
-          <a:p>
-            <a:r>
-              <a:rPr lang="en-US" sz="2000" dirty="0"/>
-              <a:t>Resizing</a:t>
-            </a:r>
-          </a:p>
-          <a:p>
-            <a:r>
-              <a:rPr lang="en-US" sz="2000" dirty="0"/>
-              <a:t>Real-time Monitoring for Implant</a:t>
-            </a:r>
-          </a:p>
-          <a:p>
-            <a:r>
-              <a:rPr lang="en-US" sz="2000" dirty="0"/>
-              <a:t>New tabs:</a:t>
-            </a:r>
-          </a:p>
-          <a:p>
-            <a:pPr lvl="1"/>
-            <a:r>
-              <a:rPr lang="en-US" sz="2000" dirty="0"/>
-              <a:t>Listener Creation</a:t>
-            </a:r>
-          </a:p>
-          <a:p>
-            <a:pPr lvl="1"/>
-            <a:r>
-              <a:rPr lang="en-US" sz="2000" dirty="0"/>
-              <a:t>General Settings</a:t>
-            </a:r>
-          </a:p>
-        </p:txBody>
-      </p:sp>
-      <p:pic>
-        <p:nvPicPr>
-          <p:cNvPr id="6" name="Picture 5" descr="Graph on document with pen">
-            <a:extLst>
-              <a:ext uri="{FF2B5EF4-FFF2-40B4-BE49-F238E27FC236}">
-                <a16:creationId xmlns:a16="http://schemas.microsoft.com/office/drawing/2014/main" id="{C36F1C0C-F2B1-F0DD-8F4B-4D85FD063553}"/>
-              </a:ext>
-            </a:extLst>
-          </p:cNvPr>
-          <p:cNvPicPr>
-            <a:picLocks noChangeAspect="1"/>
-          </p:cNvPicPr>
-          <p:nvPr/>
-        </p:nvPicPr>
-        <p:blipFill rotWithShape="1">
-          <a:blip r:embed="rId2"/>
-          <a:srcRect l="27161" r="13438" b="-2"/>
-          <a:stretch/>
-        </p:blipFill>
-        <p:spPr>
-          <a:xfrm>
-            <a:off x="6096000" y="1"/>
-            <a:ext cx="6102825" cy="6858000"/>
-          </a:xfrm>
-          <a:prstGeom prst="rect">
-            <a:avLst/>
-          </a:prstGeom>
-        </p:spPr>
-      </p:pic>
-      <p:sp>
-        <p:nvSpPr>
-          <p:cNvPr id="4" name="Slide Number Placeholder 3">
-            <a:extLst>
-              <a:ext uri="{FF2B5EF4-FFF2-40B4-BE49-F238E27FC236}">
-                <a16:creationId xmlns:a16="http://schemas.microsoft.com/office/drawing/2014/main" id="{D0A5D4C0-13FF-B554-F6F0-CD717181E5F2}"/>
-              </a:ext>
-            </a:extLst>
-          </p:cNvPr>
-          <p:cNvSpPr>
-            <a:spLocks noGrp="1"/>
-          </p:cNvSpPr>
-          <p:nvPr>
-            <p:ph type="sldNum" sz="quarter" idx="12"/>
-          </p:nvPr>
-        </p:nvSpPr>
-        <p:spPr>
-          <a:xfrm>
-            <a:off x="8732520" y="6356350"/>
-            <a:ext cx="3200400" cy="365125"/>
-          </a:xfrm>
-        </p:spPr>
-        <p:txBody>
-          <a:bodyPr>
-            <a:normAutofit/>
+          <a:bodyPr wrap="square">
+            <a:spAutoFit/>
           </a:bodyPr>
           <a:lstStyle/>
           <a:p>
@@ -15073,31 +16601,17 @@
                 <a:spcPts val="600"/>
               </a:spcAft>
             </a:pPr>
-            <a:fld id="{A52BEA90-E6BE-45F4-8D5D-C2E01FE3DBCB}" type="slidenum">
-              <a:rPr lang="en-US">
-                <a:solidFill>
-                  <a:srgbClr val="FFFFFF"/>
-                </a:solidFill>
-              </a:rPr>
-              <a:pPr>
-                <a:spcAft>
-                  <a:spcPts val="600"/>
-                </a:spcAft>
-              </a:pPr>
-              <a:t>9</a:t>
-            </a:fld>
-            <a:endParaRPr lang="en-US">
-              <a:solidFill>
-                <a:srgbClr val="FFFFFF"/>
-              </a:solidFill>
-            </a:endParaRPr>
+            <a:r>
+              <a:rPr lang="en-US" sz="1200" dirty="0"/>
+              <a:t>G. Resto, K. Domenech, C. Roque Adversary Emulation Framework</a:t>
+            </a:r>
           </a:p>
         </p:txBody>
       </p:sp>
     </p:spTree>
     <p:extLst>
       <p:ext uri="{BB962C8B-B14F-4D97-AF65-F5344CB8AC3E}">
-        <p14:creationId xmlns:p14="http://schemas.microsoft.com/office/powerpoint/2010/main" val="2300167628"/>
+        <p14:creationId xmlns:p14="http://schemas.microsoft.com/office/powerpoint/2010/main" val="14020583"/>
       </p:ext>
     </p:extLst>
   </p:cSld>

</xml_diff>